<commit_message>
Updated use case diagram
</commit_message>
<xml_diff>
--- a/Presentation/Presentation1.pptx
+++ b/Presentation/Presentation1.pptx
@@ -250,7 +250,7 @@
           <a:p>
             <a:fld id="{09D18E99-B5C3-45FC-AF5A-D413D846BC60}" type="datetimeFigureOut">
               <a:rPr lang="en-IN" smtClean="0"/>
-              <a:t>01-10-2019</a:t>
+              <a:t>05-10-2019</a:t>
             </a:fld>
             <a:endParaRPr lang="en-IN"/>
           </a:p>
@@ -420,7 +420,7 @@
           <a:p>
             <a:fld id="{09D18E99-B5C3-45FC-AF5A-D413D846BC60}" type="datetimeFigureOut">
               <a:rPr lang="en-IN" smtClean="0"/>
-              <a:t>01-10-2019</a:t>
+              <a:t>05-10-2019</a:t>
             </a:fld>
             <a:endParaRPr lang="en-IN"/>
           </a:p>
@@ -600,7 +600,7 @@
           <a:p>
             <a:fld id="{09D18E99-B5C3-45FC-AF5A-D413D846BC60}" type="datetimeFigureOut">
               <a:rPr lang="en-IN" smtClean="0"/>
-              <a:t>01-10-2019</a:t>
+              <a:t>05-10-2019</a:t>
             </a:fld>
             <a:endParaRPr lang="en-IN"/>
           </a:p>
@@ -770,7 +770,7 @@
           <a:p>
             <a:fld id="{09D18E99-B5C3-45FC-AF5A-D413D846BC60}" type="datetimeFigureOut">
               <a:rPr lang="en-IN" smtClean="0"/>
-              <a:t>01-10-2019</a:t>
+              <a:t>05-10-2019</a:t>
             </a:fld>
             <a:endParaRPr lang="en-IN"/>
           </a:p>
@@ -1016,7 +1016,7 @@
           <a:p>
             <a:fld id="{09D18E99-B5C3-45FC-AF5A-D413D846BC60}" type="datetimeFigureOut">
               <a:rPr lang="en-IN" smtClean="0"/>
-              <a:t>01-10-2019</a:t>
+              <a:t>05-10-2019</a:t>
             </a:fld>
             <a:endParaRPr lang="en-IN"/>
           </a:p>
@@ -1248,7 +1248,7 @@
           <a:p>
             <a:fld id="{09D18E99-B5C3-45FC-AF5A-D413D846BC60}" type="datetimeFigureOut">
               <a:rPr lang="en-IN" smtClean="0"/>
-              <a:t>01-10-2019</a:t>
+              <a:t>05-10-2019</a:t>
             </a:fld>
             <a:endParaRPr lang="en-IN"/>
           </a:p>
@@ -1615,7 +1615,7 @@
           <a:p>
             <a:fld id="{09D18E99-B5C3-45FC-AF5A-D413D846BC60}" type="datetimeFigureOut">
               <a:rPr lang="en-IN" smtClean="0"/>
-              <a:t>01-10-2019</a:t>
+              <a:t>05-10-2019</a:t>
             </a:fld>
             <a:endParaRPr lang="en-IN"/>
           </a:p>
@@ -1733,7 +1733,7 @@
           <a:p>
             <a:fld id="{09D18E99-B5C3-45FC-AF5A-D413D846BC60}" type="datetimeFigureOut">
               <a:rPr lang="en-IN" smtClean="0"/>
-              <a:t>01-10-2019</a:t>
+              <a:t>05-10-2019</a:t>
             </a:fld>
             <a:endParaRPr lang="en-IN"/>
           </a:p>
@@ -1828,7 +1828,7 @@
           <a:p>
             <a:fld id="{09D18E99-B5C3-45FC-AF5A-D413D846BC60}" type="datetimeFigureOut">
               <a:rPr lang="en-IN" smtClean="0"/>
-              <a:t>01-10-2019</a:t>
+              <a:t>05-10-2019</a:t>
             </a:fld>
             <a:endParaRPr lang="en-IN"/>
           </a:p>
@@ -2105,7 +2105,7 @@
           <a:p>
             <a:fld id="{09D18E99-B5C3-45FC-AF5A-D413D846BC60}" type="datetimeFigureOut">
               <a:rPr lang="en-IN" smtClean="0"/>
-              <a:t>01-10-2019</a:t>
+              <a:t>05-10-2019</a:t>
             </a:fld>
             <a:endParaRPr lang="en-IN"/>
           </a:p>
@@ -2358,7 +2358,7 @@
           <a:p>
             <a:fld id="{09D18E99-B5C3-45FC-AF5A-D413D846BC60}" type="datetimeFigureOut">
               <a:rPr lang="en-IN" smtClean="0"/>
-              <a:t>01-10-2019</a:t>
+              <a:t>05-10-2019</a:t>
             </a:fld>
             <a:endParaRPr lang="en-IN"/>
           </a:p>
@@ -2571,7 +2571,7 @@
           <a:p>
             <a:fld id="{09D18E99-B5C3-45FC-AF5A-D413D846BC60}" type="datetimeFigureOut">
               <a:rPr lang="en-IN" smtClean="0"/>
-              <a:t>01-10-2019</a:t>
+              <a:t>05-10-2019</a:t>
             </a:fld>
             <a:endParaRPr lang="en-IN"/>
           </a:p>
@@ -3046,7 +3046,7 @@
       </p:grpSpPr>
       <p:pic>
         <p:nvPicPr>
-          <p:cNvPr id="1028" name="Picture 4" descr="https://documents.lucidchart.com/documents/a1e98e32-fd67-464b-b282-dac8597c6c15/pages/~7PW.lekc_3L?a=2103&amp;x=141&amp;y=64&amp;w=858&amp;h=1232&amp;store=1&amp;accept=image%2F*&amp;auth=LCA%20a89cbd0fb4820f1916f8d27525e0de9916325ea4-ts%3D1569909084"/>
+          <p:cNvPr id="3074" name="Picture 2" descr="https://documents.lucidchart.com/documents/a1e98e32-fd67-464b-b282-dac8597c6c15/pages/~7PW.lekc_3L?a=2201&amp;x=213&amp;y=64&amp;w=1034&amp;h=1232&amp;store=1&amp;accept=image%2F*&amp;auth=LCA%20d9d64479b3c78416dcbf90fa5c0a570f441b9273-ts%3D1570274340"/>
           <p:cNvPicPr>
             <a:picLocks noChangeAspect="1" noChangeArrowheads="1"/>
           </p:cNvPicPr>
@@ -3067,8 +3067,8 @@
         </p:blipFill>
         <p:spPr bwMode="auto">
           <a:xfrm>
-            <a:off x="3220795" y="75135"/>
-            <a:ext cx="4727451" cy="6782865"/>
+            <a:off x="3222331" y="104652"/>
+            <a:ext cx="5281766" cy="6289114"/>
           </a:xfrm>
           <a:prstGeom prst="rect">
             <a:avLst/>
@@ -3117,7 +3117,7 @@
       </p:grpSpPr>
       <p:pic>
         <p:nvPicPr>
-          <p:cNvPr id="1026" name="Picture 2" descr="https://documents.lucidchart.com/documents/a1e98e32-fd67-464b-b282-dac8597c6c15/pages/0_0?a=1597&amp;x=105&amp;y=104&amp;w=770&amp;h=792&amp;store=1&amp;accept=image%2F*&amp;auth=LCA%20395108c8b26200922945c75e6cbb2ff951a66ae4-ts%3D1569909084"/>
+          <p:cNvPr id="2" name="Picture 2" descr="https://documents.lucidchart.com/documents/a1e98e32-fd67-464b-b282-dac8597c6c15/pages/0_0?a=2129&amp;x=93&amp;y=104&amp;w=1034&amp;h=792&amp;store=1&amp;accept=image%2F*&amp;auth=LCA%2079fad50444792ba0a50edcc611463ae41142806e-ts%3D1570274340"/>
           <p:cNvPicPr>
             <a:picLocks noChangeAspect="1" noChangeArrowheads="1"/>
           </p:cNvPicPr>
@@ -3138,8 +3138,8 @@
         </p:blipFill>
         <p:spPr bwMode="auto">
           <a:xfrm>
-            <a:off x="2870640" y="900333"/>
-            <a:ext cx="5495925" cy="5657851"/>
+            <a:off x="2265729" y="480329"/>
+            <a:ext cx="7391400" cy="5657851"/>
           </a:xfrm>
           <a:prstGeom prst="rect">
             <a:avLst/>
@@ -3188,7 +3188,7 @@
       </p:grpSpPr>
       <p:pic>
         <p:nvPicPr>
-          <p:cNvPr id="2052" name="Picture 4" descr="https://documents.lucidchart.com/documents/a1e98e32-fd67-464b-b282-dac8597c6c15/pages/j0PWhM3VBgoU?a=2106&amp;x=152&amp;y=12&amp;w=1160&amp;h=1056&amp;store=1&amp;accept=image%2F*&amp;auth=LCA%2010240bfaad896e3bb5b976499a9854998d8098da-ts%3D1569909084"/>
+          <p:cNvPr id="2" name="Picture 4" descr="https://documents.lucidchart.com/documents/a1e98e32-fd67-464b-b282-dac8597c6c15/pages/j0PWhM3VBgoU?a=2165&amp;x=152&amp;y=14&amp;w=1160&amp;h=1012&amp;store=1&amp;accept=image%2F*&amp;auth=LCA%20f9cd1337b5b853ba2da7fbd3d8bcc80b158b8af0-ts%3D1570274340"/>
           <p:cNvPicPr>
             <a:picLocks noChangeAspect="1" noChangeArrowheads="1"/>
           </p:cNvPicPr>
@@ -3209,8 +3209,8 @@
         </p:blipFill>
         <p:spPr bwMode="auto">
           <a:xfrm>
-            <a:off x="3051311" y="703384"/>
-            <a:ext cx="6150353" cy="5598942"/>
+            <a:off x="2672862" y="315899"/>
+            <a:ext cx="7136038" cy="6225578"/>
           </a:xfrm>
           <a:prstGeom prst="rect">
             <a:avLst/>
@@ -3472,7 +3472,7 @@
       </p:grpSpPr>
       <p:pic>
         <p:nvPicPr>
-          <p:cNvPr id="6146" name="Picture 2" descr="https://documents.lucidchart.com/documents/d366455b-08d0-412e-9604-7000d4bd7087/pages/saSWjGW1vwpR?a=1112&amp;x=105&amp;y=-4&amp;w=1210&amp;h=884&amp;store=1&amp;accept=image%2F*&amp;auth=LCA%206ffa078569be00a7ad66eb9f9b7d7d26d1011843-ts%3D1569919834"/>
+          <p:cNvPr id="1026" name="Picture 2" descr="https://documents.lucidchart.com/documents/d366455b-08d0-412e-9604-7000d4bd7087/pages/saSWjGW1vwpR?a=1143&amp;x=105&amp;y=-4&amp;w=1210&amp;h=884&amp;store=1&amp;accept=image%2F*&amp;auth=LCA%2005a29ebf857c139cb8201f08c5664bae9c548209-ts%3D1570105040"/>
           <p:cNvPicPr>
             <a:picLocks noChangeAspect="1" noChangeArrowheads="1"/>
           </p:cNvPicPr>
@@ -3493,7 +3493,7 @@
         </p:blipFill>
         <p:spPr bwMode="auto">
           <a:xfrm>
-            <a:off x="1603375" y="323850"/>
+            <a:off x="1674886" y="253584"/>
             <a:ext cx="8648700" cy="6315076"/>
           </a:xfrm>
           <a:prstGeom prst="rect">

</xml_diff>

<commit_message>
updated with abhishek ppt
</commit_message>
<xml_diff>
--- a/Presentation/Presentation1.pptx
+++ b/Presentation/Presentation1.pptx
@@ -4,32 +4,15 @@
   <p:sldMasterIdLst>
     <p:sldMasterId id="2147483648" r:id="rId1"/>
   </p:sldMasterIdLst>
-  <p:notesMasterIdLst>
-    <p:notesMasterId r:id="rId24"/>
-  </p:notesMasterIdLst>
   <p:sldIdLst>
     <p:sldId id="256" r:id="rId2"/>
     <p:sldId id="261" r:id="rId3"/>
     <p:sldId id="257" r:id="rId4"/>
     <p:sldId id="258" r:id="rId5"/>
-    <p:sldId id="265" r:id="rId6"/>
-    <p:sldId id="266" r:id="rId7"/>
-    <p:sldId id="268" r:id="rId8"/>
-    <p:sldId id="269" r:id="rId9"/>
-    <p:sldId id="270" r:id="rId10"/>
-    <p:sldId id="264" r:id="rId11"/>
-    <p:sldId id="260" r:id="rId12"/>
-    <p:sldId id="259" r:id="rId13"/>
-    <p:sldId id="271" r:id="rId14"/>
-    <p:sldId id="272" r:id="rId15"/>
-    <p:sldId id="273" r:id="rId16"/>
-    <p:sldId id="274" r:id="rId17"/>
-    <p:sldId id="277" r:id="rId18"/>
-    <p:sldId id="278" r:id="rId19"/>
-    <p:sldId id="262" r:id="rId20"/>
-    <p:sldId id="263" r:id="rId21"/>
-    <p:sldId id="279" r:id="rId22"/>
-    <p:sldId id="280" r:id="rId23"/>
+    <p:sldId id="259" r:id="rId6"/>
+    <p:sldId id="260" r:id="rId7"/>
+    <p:sldId id="262" r:id="rId8"/>
+    <p:sldId id="263" r:id="rId9"/>
   </p:sldIdLst>
   <p:sldSz cx="12192000" cy="6858000"/>
   <p:notesSz cx="6858000" cy="9144000"/>
@@ -136,440 +119,6 @@
 </p:presentation>
 </file>
 
-<file path=ppt/notesMasters/notesMaster1.xml><?xml version="1.0" encoding="utf-8"?>
-<p:notesMaster xmlns:a="http://schemas.openxmlformats.org/drawingml/2006/main" xmlns:r="http://schemas.openxmlformats.org/officeDocument/2006/relationships" xmlns:p="http://schemas.openxmlformats.org/presentationml/2006/main">
-  <p:cSld>
-    <p:bg>
-      <p:bgRef idx="1001">
-        <a:schemeClr val="bg1"/>
-      </p:bgRef>
-    </p:bg>
-    <p:spTree>
-      <p:nvGrpSpPr>
-        <p:cNvPr id="1" name=""/>
-        <p:cNvGrpSpPr/>
-        <p:nvPr/>
-      </p:nvGrpSpPr>
-      <p:grpSpPr>
-        <a:xfrm>
-          <a:off x="0" y="0"/>
-          <a:ext cx="0" cy="0"/>
-          <a:chOff x="0" y="0"/>
-          <a:chExt cx="0" cy="0"/>
-        </a:xfrm>
-      </p:grpSpPr>
-      <p:sp>
-        <p:nvSpPr>
-          <p:cNvPr id="2" name="Header Placeholder 1"/>
-          <p:cNvSpPr>
-            <a:spLocks noGrp="1"/>
-          </p:cNvSpPr>
-          <p:nvPr>
-            <p:ph type="hdr" sz="quarter"/>
-          </p:nvPr>
-        </p:nvSpPr>
-        <p:spPr>
-          <a:xfrm>
-            <a:off x="0" y="0"/>
-            <a:ext cx="2971800" cy="458788"/>
-          </a:xfrm>
-          <a:prstGeom prst="rect">
-            <a:avLst/>
-          </a:prstGeom>
-        </p:spPr>
-        <p:txBody>
-          <a:bodyPr vert="horz" lIns="91440" tIns="45720" rIns="91440" bIns="45720" rtlCol="0"/>
-          <a:lstStyle>
-            <a:lvl1pPr algn="l">
-              <a:defRPr sz="1200"/>
-            </a:lvl1pPr>
-          </a:lstStyle>
-          <a:p>
-            <a:endParaRPr lang="en-IN"/>
-          </a:p>
-        </p:txBody>
-      </p:sp>
-      <p:sp>
-        <p:nvSpPr>
-          <p:cNvPr id="3" name="Date Placeholder 2"/>
-          <p:cNvSpPr>
-            <a:spLocks noGrp="1"/>
-          </p:cNvSpPr>
-          <p:nvPr>
-            <p:ph type="dt" idx="1"/>
-          </p:nvPr>
-        </p:nvSpPr>
-        <p:spPr>
-          <a:xfrm>
-            <a:off x="3884613" y="0"/>
-            <a:ext cx="2971800" cy="458788"/>
-          </a:xfrm>
-          <a:prstGeom prst="rect">
-            <a:avLst/>
-          </a:prstGeom>
-        </p:spPr>
-        <p:txBody>
-          <a:bodyPr vert="horz" lIns="91440" tIns="45720" rIns="91440" bIns="45720" rtlCol="0"/>
-          <a:lstStyle>
-            <a:lvl1pPr algn="r">
-              <a:defRPr sz="1200"/>
-            </a:lvl1pPr>
-          </a:lstStyle>
-          <a:p>
-            <a:fld id="{E076D40F-BF8C-4573-A495-F3D84B88FC9D}" type="datetimeFigureOut">
-              <a:rPr lang="en-IN" smtClean="0"/>
-              <a:t>06-10-2019</a:t>
-            </a:fld>
-            <a:endParaRPr lang="en-IN"/>
-          </a:p>
-        </p:txBody>
-      </p:sp>
-      <p:sp>
-        <p:nvSpPr>
-          <p:cNvPr id="4" name="Slide Image Placeholder 3"/>
-          <p:cNvSpPr>
-            <a:spLocks noGrp="1" noRot="1" noChangeAspect="1"/>
-          </p:cNvSpPr>
-          <p:nvPr>
-            <p:ph type="sldImg" idx="2"/>
-          </p:nvPr>
-        </p:nvSpPr>
-        <p:spPr>
-          <a:xfrm>
-            <a:off x="685800" y="1143000"/>
-            <a:ext cx="5486400" cy="3086100"/>
-          </a:xfrm>
-          <a:prstGeom prst="rect">
-            <a:avLst/>
-          </a:prstGeom>
-          <a:noFill/>
-          <a:ln w="12700">
-            <a:solidFill>
-              <a:prstClr val="black"/>
-            </a:solidFill>
-          </a:ln>
-        </p:spPr>
-        <p:txBody>
-          <a:bodyPr vert="horz" lIns="91440" tIns="45720" rIns="91440" bIns="45720" rtlCol="0" anchor="ctr"/>
-          <a:lstStyle/>
-          <a:p>
-            <a:endParaRPr lang="en-IN"/>
-          </a:p>
-        </p:txBody>
-      </p:sp>
-      <p:sp>
-        <p:nvSpPr>
-          <p:cNvPr id="5" name="Notes Placeholder 4"/>
-          <p:cNvSpPr>
-            <a:spLocks noGrp="1"/>
-          </p:cNvSpPr>
-          <p:nvPr>
-            <p:ph type="body" sz="quarter" idx="3"/>
-          </p:nvPr>
-        </p:nvSpPr>
-        <p:spPr>
-          <a:xfrm>
-            <a:off x="685800" y="4400550"/>
-            <a:ext cx="5486400" cy="3600450"/>
-          </a:xfrm>
-          <a:prstGeom prst="rect">
-            <a:avLst/>
-          </a:prstGeom>
-        </p:spPr>
-        <p:txBody>
-          <a:bodyPr vert="horz" lIns="91440" tIns="45720" rIns="91440" bIns="45720" rtlCol="0"/>
-          <a:lstStyle/>
-          <a:p>
-            <a:pPr lvl="0"/>
-            <a:r>
-              <a:rPr lang="en-US"/>
-              <a:t>Click to edit Master text styles</a:t>
-            </a:r>
-          </a:p>
-          <a:p>
-            <a:pPr lvl="1"/>
-            <a:r>
-              <a:rPr lang="en-US"/>
-              <a:t>Second level</a:t>
-            </a:r>
-          </a:p>
-          <a:p>
-            <a:pPr lvl="2"/>
-            <a:r>
-              <a:rPr lang="en-US"/>
-              <a:t>Third level</a:t>
-            </a:r>
-          </a:p>
-          <a:p>
-            <a:pPr lvl="3"/>
-            <a:r>
-              <a:rPr lang="en-US"/>
-              <a:t>Fourth level</a:t>
-            </a:r>
-          </a:p>
-          <a:p>
-            <a:pPr lvl="4"/>
-            <a:r>
-              <a:rPr lang="en-US"/>
-              <a:t>Fifth level</a:t>
-            </a:r>
-            <a:endParaRPr lang="en-IN"/>
-          </a:p>
-        </p:txBody>
-      </p:sp>
-      <p:sp>
-        <p:nvSpPr>
-          <p:cNvPr id="6" name="Footer Placeholder 5"/>
-          <p:cNvSpPr>
-            <a:spLocks noGrp="1"/>
-          </p:cNvSpPr>
-          <p:nvPr>
-            <p:ph type="ftr" sz="quarter" idx="4"/>
-          </p:nvPr>
-        </p:nvSpPr>
-        <p:spPr>
-          <a:xfrm>
-            <a:off x="0" y="8685213"/>
-            <a:ext cx="2971800" cy="458787"/>
-          </a:xfrm>
-          <a:prstGeom prst="rect">
-            <a:avLst/>
-          </a:prstGeom>
-        </p:spPr>
-        <p:txBody>
-          <a:bodyPr vert="horz" lIns="91440" tIns="45720" rIns="91440" bIns="45720" rtlCol="0" anchor="b"/>
-          <a:lstStyle>
-            <a:lvl1pPr algn="l">
-              <a:defRPr sz="1200"/>
-            </a:lvl1pPr>
-          </a:lstStyle>
-          <a:p>
-            <a:endParaRPr lang="en-IN"/>
-          </a:p>
-        </p:txBody>
-      </p:sp>
-      <p:sp>
-        <p:nvSpPr>
-          <p:cNvPr id="7" name="Slide Number Placeholder 6"/>
-          <p:cNvSpPr>
-            <a:spLocks noGrp="1"/>
-          </p:cNvSpPr>
-          <p:nvPr>
-            <p:ph type="sldNum" sz="quarter" idx="5"/>
-          </p:nvPr>
-        </p:nvSpPr>
-        <p:spPr>
-          <a:xfrm>
-            <a:off x="3884613" y="8685213"/>
-            <a:ext cx="2971800" cy="458787"/>
-          </a:xfrm>
-          <a:prstGeom prst="rect">
-            <a:avLst/>
-          </a:prstGeom>
-        </p:spPr>
-        <p:txBody>
-          <a:bodyPr vert="horz" lIns="91440" tIns="45720" rIns="91440" bIns="45720" rtlCol="0" anchor="b"/>
-          <a:lstStyle>
-            <a:lvl1pPr algn="r">
-              <a:defRPr sz="1200"/>
-            </a:lvl1pPr>
-          </a:lstStyle>
-          <a:p>
-            <a:fld id="{3216C2BB-91EB-4BFC-BD7B-5BAB4FC0B009}" type="slidenum">
-              <a:rPr lang="en-IN" smtClean="0"/>
-              <a:t>‹#›</a:t>
-            </a:fld>
-            <a:endParaRPr lang="en-IN"/>
-          </a:p>
-        </p:txBody>
-      </p:sp>
-    </p:spTree>
-    <p:extLst>
-      <p:ext uri="{BB962C8B-B14F-4D97-AF65-F5344CB8AC3E}">
-        <p14:creationId xmlns:p14="http://schemas.microsoft.com/office/powerpoint/2010/main" val="378891153"/>
-      </p:ext>
-    </p:extLst>
-  </p:cSld>
-  <p:clrMap bg1="lt1" tx1="dk1" bg2="lt2" tx2="dk2" accent1="accent1" accent2="accent2" accent3="accent3" accent4="accent4" accent5="accent5" accent6="accent6" hlink="hlink" folHlink="folHlink"/>
-  <p:notesStyle>
-    <a:lvl1pPr marL="0" algn="l" defTabSz="914400" rtl="0" eaLnBrk="1" latinLnBrk="0" hangingPunct="1">
-      <a:defRPr sz="1200" kern="1200">
-        <a:solidFill>
-          <a:schemeClr val="tx1"/>
-        </a:solidFill>
-        <a:latin typeface="+mn-lt"/>
-        <a:ea typeface="+mn-ea"/>
-        <a:cs typeface="+mn-cs"/>
-      </a:defRPr>
-    </a:lvl1pPr>
-    <a:lvl2pPr marL="457200" algn="l" defTabSz="914400" rtl="0" eaLnBrk="1" latinLnBrk="0" hangingPunct="1">
-      <a:defRPr sz="1200" kern="1200">
-        <a:solidFill>
-          <a:schemeClr val="tx1"/>
-        </a:solidFill>
-        <a:latin typeface="+mn-lt"/>
-        <a:ea typeface="+mn-ea"/>
-        <a:cs typeface="+mn-cs"/>
-      </a:defRPr>
-    </a:lvl2pPr>
-    <a:lvl3pPr marL="914400" algn="l" defTabSz="914400" rtl="0" eaLnBrk="1" latinLnBrk="0" hangingPunct="1">
-      <a:defRPr sz="1200" kern="1200">
-        <a:solidFill>
-          <a:schemeClr val="tx1"/>
-        </a:solidFill>
-        <a:latin typeface="+mn-lt"/>
-        <a:ea typeface="+mn-ea"/>
-        <a:cs typeface="+mn-cs"/>
-      </a:defRPr>
-    </a:lvl3pPr>
-    <a:lvl4pPr marL="1371600" algn="l" defTabSz="914400" rtl="0" eaLnBrk="1" latinLnBrk="0" hangingPunct="1">
-      <a:defRPr sz="1200" kern="1200">
-        <a:solidFill>
-          <a:schemeClr val="tx1"/>
-        </a:solidFill>
-        <a:latin typeface="+mn-lt"/>
-        <a:ea typeface="+mn-ea"/>
-        <a:cs typeface="+mn-cs"/>
-      </a:defRPr>
-    </a:lvl4pPr>
-    <a:lvl5pPr marL="1828800" algn="l" defTabSz="914400" rtl="0" eaLnBrk="1" latinLnBrk="0" hangingPunct="1">
-      <a:defRPr sz="1200" kern="1200">
-        <a:solidFill>
-          <a:schemeClr val="tx1"/>
-        </a:solidFill>
-        <a:latin typeface="+mn-lt"/>
-        <a:ea typeface="+mn-ea"/>
-        <a:cs typeface="+mn-cs"/>
-      </a:defRPr>
-    </a:lvl5pPr>
-    <a:lvl6pPr marL="2286000" algn="l" defTabSz="914400" rtl="0" eaLnBrk="1" latinLnBrk="0" hangingPunct="1">
-      <a:defRPr sz="1200" kern="1200">
-        <a:solidFill>
-          <a:schemeClr val="tx1"/>
-        </a:solidFill>
-        <a:latin typeface="+mn-lt"/>
-        <a:ea typeface="+mn-ea"/>
-        <a:cs typeface="+mn-cs"/>
-      </a:defRPr>
-    </a:lvl6pPr>
-    <a:lvl7pPr marL="2743200" algn="l" defTabSz="914400" rtl="0" eaLnBrk="1" latinLnBrk="0" hangingPunct="1">
-      <a:defRPr sz="1200" kern="1200">
-        <a:solidFill>
-          <a:schemeClr val="tx1"/>
-        </a:solidFill>
-        <a:latin typeface="+mn-lt"/>
-        <a:ea typeface="+mn-ea"/>
-        <a:cs typeface="+mn-cs"/>
-      </a:defRPr>
-    </a:lvl7pPr>
-    <a:lvl8pPr marL="3200400" algn="l" defTabSz="914400" rtl="0" eaLnBrk="1" latinLnBrk="0" hangingPunct="1">
-      <a:defRPr sz="1200" kern="1200">
-        <a:solidFill>
-          <a:schemeClr val="tx1"/>
-        </a:solidFill>
-        <a:latin typeface="+mn-lt"/>
-        <a:ea typeface="+mn-ea"/>
-        <a:cs typeface="+mn-cs"/>
-      </a:defRPr>
-    </a:lvl8pPr>
-    <a:lvl9pPr marL="3657600" algn="l" defTabSz="914400" rtl="0" eaLnBrk="1" latinLnBrk="0" hangingPunct="1">
-      <a:defRPr sz="1200" kern="1200">
-        <a:solidFill>
-          <a:schemeClr val="tx1"/>
-        </a:solidFill>
-        <a:latin typeface="+mn-lt"/>
-        <a:ea typeface="+mn-ea"/>
-        <a:cs typeface="+mn-cs"/>
-      </a:defRPr>
-    </a:lvl9pPr>
-  </p:notesStyle>
-</p:notesMaster>
-</file>
-
-<file path=ppt/notesSlides/notesSlide1.xml><?xml version="1.0" encoding="utf-8"?>
-<p:notes xmlns:a="http://schemas.openxmlformats.org/drawingml/2006/main" xmlns:r="http://schemas.openxmlformats.org/officeDocument/2006/relationships" xmlns:p="http://schemas.openxmlformats.org/presentationml/2006/main">
-  <p:cSld>
-    <p:spTree>
-      <p:nvGrpSpPr>
-        <p:cNvPr id="1" name=""/>
-        <p:cNvGrpSpPr/>
-        <p:nvPr/>
-      </p:nvGrpSpPr>
-      <p:grpSpPr>
-        <a:xfrm>
-          <a:off x="0" y="0"/>
-          <a:ext cx="0" cy="0"/>
-          <a:chOff x="0" y="0"/>
-          <a:chExt cx="0" cy="0"/>
-        </a:xfrm>
-      </p:grpSpPr>
-      <p:sp>
-        <p:nvSpPr>
-          <p:cNvPr id="2" name="Slide Image Placeholder 1"/>
-          <p:cNvSpPr>
-            <a:spLocks noGrp="1" noRot="1" noChangeAspect="1"/>
-          </p:cNvSpPr>
-          <p:nvPr>
-            <p:ph type="sldImg"/>
-          </p:nvPr>
-        </p:nvSpPr>
-        <p:spPr/>
-      </p:sp>
-      <p:sp>
-        <p:nvSpPr>
-          <p:cNvPr id="3" name="Notes Placeholder 2"/>
-          <p:cNvSpPr>
-            <a:spLocks noGrp="1"/>
-          </p:cNvSpPr>
-          <p:nvPr>
-            <p:ph type="body" idx="1"/>
-          </p:nvPr>
-        </p:nvSpPr>
-        <p:spPr/>
-        <p:txBody>
-          <a:bodyPr/>
-          <a:lstStyle/>
-          <a:p>
-            <a:endParaRPr lang="en-IN" dirty="0"/>
-          </a:p>
-        </p:txBody>
-      </p:sp>
-      <p:sp>
-        <p:nvSpPr>
-          <p:cNvPr id="4" name="Slide Number Placeholder 3"/>
-          <p:cNvSpPr>
-            <a:spLocks noGrp="1"/>
-          </p:cNvSpPr>
-          <p:nvPr>
-            <p:ph type="sldNum" sz="quarter" idx="10"/>
-          </p:nvPr>
-        </p:nvSpPr>
-        <p:spPr/>
-        <p:txBody>
-          <a:bodyPr/>
-          <a:lstStyle/>
-          <a:p>
-            <a:fld id="{C6F95341-58BE-4992-B563-675A9B88D29C}" type="slidenum">
-              <a:rPr lang="en-IN" smtClean="0"/>
-              <a:t>6</a:t>
-            </a:fld>
-            <a:endParaRPr lang="en-IN"/>
-          </a:p>
-        </p:txBody>
-      </p:sp>
-    </p:spTree>
-    <p:extLst>
-      <p:ext uri="{BB962C8B-B14F-4D97-AF65-F5344CB8AC3E}">
-        <p14:creationId xmlns:p14="http://schemas.microsoft.com/office/powerpoint/2010/main" val="65256277"/>
-      </p:ext>
-    </p:extLst>
-  </p:cSld>
-  <p:clrMapOvr>
-    <a:masterClrMapping/>
-  </p:clrMapOvr>
-</p:notes>
-</file>
-
 <file path=ppt/slideLayouts/slideLayout1.xml><?xml version="1.0" encoding="utf-8"?>
 <p:sldLayout xmlns:a="http://schemas.openxmlformats.org/drawingml/2006/main" xmlns:r="http://schemas.openxmlformats.org/officeDocument/2006/relationships" xmlns:p="http://schemas.openxmlformats.org/presentationml/2006/main" type="title" preserve="1">
   <p:cSld name="Title Slide">
@@ -612,7 +161,7 @@
           </a:lstStyle>
           <a:p>
             <a:r>
-              <a:rPr lang="en-US"/>
+              <a:rPr lang="en-US" smtClean="0"/>
               <a:t>Click to edit Master title style</a:t>
             </a:r>
             <a:endParaRPr lang="en-IN"/>
@@ -677,7 +226,7 @@
           </a:lstStyle>
           <a:p>
             <a:r>
-              <a:rPr lang="en-US"/>
+              <a:rPr lang="en-US" smtClean="0"/>
               <a:t>Click to edit Master subtitle style</a:t>
             </a:r>
             <a:endParaRPr lang="en-IN"/>
@@ -701,7 +250,7 @@
           <a:p>
             <a:fld id="{09D18E99-B5C3-45FC-AF5A-D413D846BC60}" type="datetimeFigureOut">
               <a:rPr lang="en-IN" smtClean="0"/>
-              <a:t>06-10-2019</a:t>
+              <a:t>01-10-2019</a:t>
             </a:fld>
             <a:endParaRPr lang="en-IN"/>
           </a:p>
@@ -795,7 +344,7 @@
           <a:lstStyle/>
           <a:p>
             <a:r>
-              <a:rPr lang="en-US"/>
+              <a:rPr lang="en-US" smtClean="0"/>
               <a:t>Click to edit Master title style</a:t>
             </a:r>
             <a:endParaRPr lang="en-IN"/>
@@ -819,35 +368,35 @@
           <a:p>
             <a:pPr lvl="0"/>
             <a:r>
-              <a:rPr lang="en-US"/>
+              <a:rPr lang="en-US" smtClean="0"/>
               <a:t>Click to edit Master text styles</a:t>
             </a:r>
           </a:p>
           <a:p>
             <a:pPr lvl="1"/>
             <a:r>
-              <a:rPr lang="en-US"/>
+              <a:rPr lang="en-US" smtClean="0"/>
               <a:t>Second level</a:t>
             </a:r>
           </a:p>
           <a:p>
             <a:pPr lvl="2"/>
             <a:r>
-              <a:rPr lang="en-US"/>
+              <a:rPr lang="en-US" smtClean="0"/>
               <a:t>Third level</a:t>
             </a:r>
           </a:p>
           <a:p>
             <a:pPr lvl="3"/>
             <a:r>
-              <a:rPr lang="en-US"/>
+              <a:rPr lang="en-US" smtClean="0"/>
               <a:t>Fourth level</a:t>
             </a:r>
           </a:p>
           <a:p>
             <a:pPr lvl="4"/>
             <a:r>
-              <a:rPr lang="en-US"/>
+              <a:rPr lang="en-US" smtClean="0"/>
               <a:t>Fifth level</a:t>
             </a:r>
             <a:endParaRPr lang="en-IN"/>
@@ -871,7 +420,7 @@
           <a:p>
             <a:fld id="{09D18E99-B5C3-45FC-AF5A-D413D846BC60}" type="datetimeFigureOut">
               <a:rPr lang="en-IN" smtClean="0"/>
-              <a:t>06-10-2019</a:t>
+              <a:t>01-10-2019</a:t>
             </a:fld>
             <a:endParaRPr lang="en-IN"/>
           </a:p>
@@ -970,7 +519,7 @@
           <a:lstStyle/>
           <a:p>
             <a:r>
-              <a:rPr lang="en-US"/>
+              <a:rPr lang="en-US" smtClean="0"/>
               <a:t>Click to edit Master title style</a:t>
             </a:r>
             <a:endParaRPr lang="en-IN"/>
@@ -999,35 +548,35 @@
           <a:p>
             <a:pPr lvl="0"/>
             <a:r>
-              <a:rPr lang="en-US"/>
+              <a:rPr lang="en-US" smtClean="0"/>
               <a:t>Click to edit Master text styles</a:t>
             </a:r>
           </a:p>
           <a:p>
             <a:pPr lvl="1"/>
             <a:r>
-              <a:rPr lang="en-US"/>
+              <a:rPr lang="en-US" smtClean="0"/>
               <a:t>Second level</a:t>
             </a:r>
           </a:p>
           <a:p>
             <a:pPr lvl="2"/>
             <a:r>
-              <a:rPr lang="en-US"/>
+              <a:rPr lang="en-US" smtClean="0"/>
               <a:t>Third level</a:t>
             </a:r>
           </a:p>
           <a:p>
             <a:pPr lvl="3"/>
             <a:r>
-              <a:rPr lang="en-US"/>
+              <a:rPr lang="en-US" smtClean="0"/>
               <a:t>Fourth level</a:t>
             </a:r>
           </a:p>
           <a:p>
             <a:pPr lvl="4"/>
             <a:r>
-              <a:rPr lang="en-US"/>
+              <a:rPr lang="en-US" smtClean="0"/>
               <a:t>Fifth level</a:t>
             </a:r>
             <a:endParaRPr lang="en-IN"/>
@@ -1051,7 +600,7 @@
           <a:p>
             <a:fld id="{09D18E99-B5C3-45FC-AF5A-D413D846BC60}" type="datetimeFigureOut">
               <a:rPr lang="en-IN" smtClean="0"/>
-              <a:t>06-10-2019</a:t>
+              <a:t>01-10-2019</a:t>
             </a:fld>
             <a:endParaRPr lang="en-IN"/>
           </a:p>
@@ -1145,7 +694,7 @@
           <a:lstStyle/>
           <a:p>
             <a:r>
-              <a:rPr lang="en-US"/>
+              <a:rPr lang="en-US" smtClean="0"/>
               <a:t>Click to edit Master title style</a:t>
             </a:r>
             <a:endParaRPr lang="en-IN"/>
@@ -1169,35 +718,35 @@
           <a:p>
             <a:pPr lvl="0"/>
             <a:r>
-              <a:rPr lang="en-US"/>
+              <a:rPr lang="en-US" smtClean="0"/>
               <a:t>Click to edit Master text styles</a:t>
             </a:r>
           </a:p>
           <a:p>
             <a:pPr lvl="1"/>
             <a:r>
-              <a:rPr lang="en-US"/>
+              <a:rPr lang="en-US" smtClean="0"/>
               <a:t>Second level</a:t>
             </a:r>
           </a:p>
           <a:p>
             <a:pPr lvl="2"/>
             <a:r>
-              <a:rPr lang="en-US"/>
+              <a:rPr lang="en-US" smtClean="0"/>
               <a:t>Third level</a:t>
             </a:r>
           </a:p>
           <a:p>
             <a:pPr lvl="3"/>
             <a:r>
-              <a:rPr lang="en-US"/>
+              <a:rPr lang="en-US" smtClean="0"/>
               <a:t>Fourth level</a:t>
             </a:r>
           </a:p>
           <a:p>
             <a:pPr lvl="4"/>
             <a:r>
-              <a:rPr lang="en-US"/>
+              <a:rPr lang="en-US" smtClean="0"/>
               <a:t>Fifth level</a:t>
             </a:r>
             <a:endParaRPr lang="en-IN"/>
@@ -1221,7 +770,7 @@
           <a:p>
             <a:fld id="{09D18E99-B5C3-45FC-AF5A-D413D846BC60}" type="datetimeFigureOut">
               <a:rPr lang="en-IN" smtClean="0"/>
-              <a:t>06-10-2019</a:t>
+              <a:t>01-10-2019</a:t>
             </a:fld>
             <a:endParaRPr lang="en-IN"/>
           </a:p>
@@ -1324,7 +873,7 @@
           </a:lstStyle>
           <a:p>
             <a:r>
-              <a:rPr lang="en-US"/>
+              <a:rPr lang="en-US" smtClean="0"/>
               <a:t>Click to edit Master title style</a:t>
             </a:r>
             <a:endParaRPr lang="en-IN"/>
@@ -1444,7 +993,7 @@
           <a:p>
             <a:pPr lvl="0"/>
             <a:r>
-              <a:rPr lang="en-US"/>
+              <a:rPr lang="en-US" smtClean="0"/>
               <a:t>Click to edit Master text styles</a:t>
             </a:r>
           </a:p>
@@ -1467,7 +1016,7 @@
           <a:p>
             <a:fld id="{09D18E99-B5C3-45FC-AF5A-D413D846BC60}" type="datetimeFigureOut">
               <a:rPr lang="en-IN" smtClean="0"/>
-              <a:t>06-10-2019</a:t>
+              <a:t>01-10-2019</a:t>
             </a:fld>
             <a:endParaRPr lang="en-IN"/>
           </a:p>
@@ -1561,7 +1110,7 @@
           <a:lstStyle/>
           <a:p>
             <a:r>
-              <a:rPr lang="en-US"/>
+              <a:rPr lang="en-US" smtClean="0"/>
               <a:t>Click to edit Master title style</a:t>
             </a:r>
             <a:endParaRPr lang="en-IN"/>
@@ -1590,35 +1139,35 @@
           <a:p>
             <a:pPr lvl="0"/>
             <a:r>
-              <a:rPr lang="en-US"/>
+              <a:rPr lang="en-US" smtClean="0"/>
               <a:t>Click to edit Master text styles</a:t>
             </a:r>
           </a:p>
           <a:p>
             <a:pPr lvl="1"/>
             <a:r>
-              <a:rPr lang="en-US"/>
+              <a:rPr lang="en-US" smtClean="0"/>
               <a:t>Second level</a:t>
             </a:r>
           </a:p>
           <a:p>
             <a:pPr lvl="2"/>
             <a:r>
-              <a:rPr lang="en-US"/>
+              <a:rPr lang="en-US" smtClean="0"/>
               <a:t>Third level</a:t>
             </a:r>
           </a:p>
           <a:p>
             <a:pPr lvl="3"/>
             <a:r>
-              <a:rPr lang="en-US"/>
+              <a:rPr lang="en-US" smtClean="0"/>
               <a:t>Fourth level</a:t>
             </a:r>
           </a:p>
           <a:p>
             <a:pPr lvl="4"/>
             <a:r>
-              <a:rPr lang="en-US"/>
+              <a:rPr lang="en-US" smtClean="0"/>
               <a:t>Fifth level</a:t>
             </a:r>
             <a:endParaRPr lang="en-IN"/>
@@ -1647,35 +1196,35 @@
           <a:p>
             <a:pPr lvl="0"/>
             <a:r>
-              <a:rPr lang="en-US"/>
+              <a:rPr lang="en-US" smtClean="0"/>
               <a:t>Click to edit Master text styles</a:t>
             </a:r>
           </a:p>
           <a:p>
             <a:pPr lvl="1"/>
             <a:r>
-              <a:rPr lang="en-US"/>
+              <a:rPr lang="en-US" smtClean="0"/>
               <a:t>Second level</a:t>
             </a:r>
           </a:p>
           <a:p>
             <a:pPr lvl="2"/>
             <a:r>
-              <a:rPr lang="en-US"/>
+              <a:rPr lang="en-US" smtClean="0"/>
               <a:t>Third level</a:t>
             </a:r>
           </a:p>
           <a:p>
             <a:pPr lvl="3"/>
             <a:r>
-              <a:rPr lang="en-US"/>
+              <a:rPr lang="en-US" smtClean="0"/>
               <a:t>Fourth level</a:t>
             </a:r>
           </a:p>
           <a:p>
             <a:pPr lvl="4"/>
             <a:r>
-              <a:rPr lang="en-US"/>
+              <a:rPr lang="en-US" smtClean="0"/>
               <a:t>Fifth level</a:t>
             </a:r>
             <a:endParaRPr lang="en-IN"/>
@@ -1699,7 +1248,7 @@
           <a:p>
             <a:fld id="{09D18E99-B5C3-45FC-AF5A-D413D846BC60}" type="datetimeFigureOut">
               <a:rPr lang="en-IN" smtClean="0"/>
-              <a:t>06-10-2019</a:t>
+              <a:t>01-10-2019</a:t>
             </a:fld>
             <a:endParaRPr lang="en-IN"/>
           </a:p>
@@ -1798,7 +1347,7 @@
           <a:lstStyle/>
           <a:p>
             <a:r>
-              <a:rPr lang="en-US"/>
+              <a:rPr lang="en-US" smtClean="0"/>
               <a:t>Click to edit Master title style</a:t>
             </a:r>
             <a:endParaRPr lang="en-IN"/>
@@ -1864,7 +1413,7 @@
           <a:p>
             <a:pPr lvl="0"/>
             <a:r>
-              <a:rPr lang="en-US"/>
+              <a:rPr lang="en-US" smtClean="0"/>
               <a:t>Click to edit Master text styles</a:t>
             </a:r>
           </a:p>
@@ -1892,35 +1441,35 @@
           <a:p>
             <a:pPr lvl="0"/>
             <a:r>
-              <a:rPr lang="en-US"/>
+              <a:rPr lang="en-US" smtClean="0"/>
               <a:t>Click to edit Master text styles</a:t>
             </a:r>
           </a:p>
           <a:p>
             <a:pPr lvl="1"/>
             <a:r>
-              <a:rPr lang="en-US"/>
+              <a:rPr lang="en-US" smtClean="0"/>
               <a:t>Second level</a:t>
             </a:r>
           </a:p>
           <a:p>
             <a:pPr lvl="2"/>
             <a:r>
-              <a:rPr lang="en-US"/>
+              <a:rPr lang="en-US" smtClean="0"/>
               <a:t>Third level</a:t>
             </a:r>
           </a:p>
           <a:p>
             <a:pPr lvl="3"/>
             <a:r>
-              <a:rPr lang="en-US"/>
+              <a:rPr lang="en-US" smtClean="0"/>
               <a:t>Fourth level</a:t>
             </a:r>
           </a:p>
           <a:p>
             <a:pPr lvl="4"/>
             <a:r>
-              <a:rPr lang="en-US"/>
+              <a:rPr lang="en-US" smtClean="0"/>
               <a:t>Fifth level</a:t>
             </a:r>
             <a:endParaRPr lang="en-IN"/>
@@ -1986,7 +1535,7 @@
           <a:p>
             <a:pPr lvl="0"/>
             <a:r>
-              <a:rPr lang="en-US"/>
+              <a:rPr lang="en-US" smtClean="0"/>
               <a:t>Click to edit Master text styles</a:t>
             </a:r>
           </a:p>
@@ -2014,35 +1563,35 @@
           <a:p>
             <a:pPr lvl="0"/>
             <a:r>
-              <a:rPr lang="en-US"/>
+              <a:rPr lang="en-US" smtClean="0"/>
               <a:t>Click to edit Master text styles</a:t>
             </a:r>
           </a:p>
           <a:p>
             <a:pPr lvl="1"/>
             <a:r>
-              <a:rPr lang="en-US"/>
+              <a:rPr lang="en-US" smtClean="0"/>
               <a:t>Second level</a:t>
             </a:r>
           </a:p>
           <a:p>
             <a:pPr lvl="2"/>
             <a:r>
-              <a:rPr lang="en-US"/>
+              <a:rPr lang="en-US" smtClean="0"/>
               <a:t>Third level</a:t>
             </a:r>
           </a:p>
           <a:p>
             <a:pPr lvl="3"/>
             <a:r>
-              <a:rPr lang="en-US"/>
+              <a:rPr lang="en-US" smtClean="0"/>
               <a:t>Fourth level</a:t>
             </a:r>
           </a:p>
           <a:p>
             <a:pPr lvl="4"/>
             <a:r>
-              <a:rPr lang="en-US"/>
+              <a:rPr lang="en-US" smtClean="0"/>
               <a:t>Fifth level</a:t>
             </a:r>
             <a:endParaRPr lang="en-IN"/>
@@ -2066,7 +1615,7 @@
           <a:p>
             <a:fld id="{09D18E99-B5C3-45FC-AF5A-D413D846BC60}" type="datetimeFigureOut">
               <a:rPr lang="en-IN" smtClean="0"/>
-              <a:t>06-10-2019</a:t>
+              <a:t>01-10-2019</a:t>
             </a:fld>
             <a:endParaRPr lang="en-IN"/>
           </a:p>
@@ -2160,7 +1709,7 @@
           <a:lstStyle/>
           <a:p>
             <a:r>
-              <a:rPr lang="en-US"/>
+              <a:rPr lang="en-US" smtClean="0"/>
               <a:t>Click to edit Master title style</a:t>
             </a:r>
             <a:endParaRPr lang="en-IN"/>
@@ -2184,7 +1733,7 @@
           <a:p>
             <a:fld id="{09D18E99-B5C3-45FC-AF5A-D413D846BC60}" type="datetimeFigureOut">
               <a:rPr lang="en-IN" smtClean="0"/>
-              <a:t>06-10-2019</a:t>
+              <a:t>01-10-2019</a:t>
             </a:fld>
             <a:endParaRPr lang="en-IN"/>
           </a:p>
@@ -2279,7 +1828,7 @@
           <a:p>
             <a:fld id="{09D18E99-B5C3-45FC-AF5A-D413D846BC60}" type="datetimeFigureOut">
               <a:rPr lang="en-IN" smtClean="0"/>
-              <a:t>06-10-2019</a:t>
+              <a:t>01-10-2019</a:t>
             </a:fld>
             <a:endParaRPr lang="en-IN"/>
           </a:p>
@@ -2382,7 +1931,7 @@
           </a:lstStyle>
           <a:p>
             <a:r>
-              <a:rPr lang="en-US"/>
+              <a:rPr lang="en-US" smtClean="0"/>
               <a:t>Click to edit Master title style</a:t>
             </a:r>
             <a:endParaRPr lang="en-IN"/>
@@ -2439,35 +1988,35 @@
           <a:p>
             <a:pPr lvl="0"/>
             <a:r>
-              <a:rPr lang="en-US"/>
+              <a:rPr lang="en-US" smtClean="0"/>
               <a:t>Click to edit Master text styles</a:t>
             </a:r>
           </a:p>
           <a:p>
             <a:pPr lvl="1"/>
             <a:r>
-              <a:rPr lang="en-US"/>
+              <a:rPr lang="en-US" smtClean="0"/>
               <a:t>Second level</a:t>
             </a:r>
           </a:p>
           <a:p>
             <a:pPr lvl="2"/>
             <a:r>
-              <a:rPr lang="en-US"/>
+              <a:rPr lang="en-US" smtClean="0"/>
               <a:t>Third level</a:t>
             </a:r>
           </a:p>
           <a:p>
             <a:pPr lvl="3"/>
             <a:r>
-              <a:rPr lang="en-US"/>
+              <a:rPr lang="en-US" smtClean="0"/>
               <a:t>Fourth level</a:t>
             </a:r>
           </a:p>
           <a:p>
             <a:pPr lvl="4"/>
             <a:r>
-              <a:rPr lang="en-US"/>
+              <a:rPr lang="en-US" smtClean="0"/>
               <a:t>Fifth level</a:t>
             </a:r>
             <a:endParaRPr lang="en-IN"/>
@@ -2533,7 +2082,7 @@
           <a:p>
             <a:pPr lvl="0"/>
             <a:r>
-              <a:rPr lang="en-US"/>
+              <a:rPr lang="en-US" smtClean="0"/>
               <a:t>Click to edit Master text styles</a:t>
             </a:r>
           </a:p>
@@ -2556,7 +2105,7 @@
           <a:p>
             <a:fld id="{09D18E99-B5C3-45FC-AF5A-D413D846BC60}" type="datetimeFigureOut">
               <a:rPr lang="en-IN" smtClean="0"/>
-              <a:t>06-10-2019</a:t>
+              <a:t>01-10-2019</a:t>
             </a:fld>
             <a:endParaRPr lang="en-IN"/>
           </a:p>
@@ -2659,7 +2208,7 @@
           </a:lstStyle>
           <a:p>
             <a:r>
-              <a:rPr lang="en-US"/>
+              <a:rPr lang="en-US" smtClean="0"/>
               <a:t>Click to edit Master title style</a:t>
             </a:r>
             <a:endParaRPr lang="en-IN"/>
@@ -2786,7 +2335,7 @@
           <a:p>
             <a:pPr lvl="0"/>
             <a:r>
-              <a:rPr lang="en-US"/>
+              <a:rPr lang="en-US" smtClean="0"/>
               <a:t>Click to edit Master text styles</a:t>
             </a:r>
           </a:p>
@@ -2809,7 +2358,7 @@
           <a:p>
             <a:fld id="{09D18E99-B5C3-45FC-AF5A-D413D846BC60}" type="datetimeFigureOut">
               <a:rPr lang="en-IN" smtClean="0"/>
-              <a:t>06-10-2019</a:t>
+              <a:t>01-10-2019</a:t>
             </a:fld>
             <a:endParaRPr lang="en-IN"/>
           </a:p>
@@ -2918,7 +2467,7 @@
           <a:lstStyle/>
           <a:p>
             <a:r>
-              <a:rPr lang="en-US"/>
+              <a:rPr lang="en-US" smtClean="0"/>
               <a:t>Click to edit Master title style</a:t>
             </a:r>
             <a:endParaRPr lang="en-IN"/>
@@ -2952,35 +2501,35 @@
           <a:p>
             <a:pPr lvl="0"/>
             <a:r>
-              <a:rPr lang="en-US"/>
+              <a:rPr lang="en-US" smtClean="0"/>
               <a:t>Click to edit Master text styles</a:t>
             </a:r>
           </a:p>
           <a:p>
             <a:pPr lvl="1"/>
             <a:r>
-              <a:rPr lang="en-US"/>
+              <a:rPr lang="en-US" smtClean="0"/>
               <a:t>Second level</a:t>
             </a:r>
           </a:p>
           <a:p>
             <a:pPr lvl="2"/>
             <a:r>
-              <a:rPr lang="en-US"/>
+              <a:rPr lang="en-US" smtClean="0"/>
               <a:t>Third level</a:t>
             </a:r>
           </a:p>
           <a:p>
             <a:pPr lvl="3"/>
             <a:r>
-              <a:rPr lang="en-US"/>
+              <a:rPr lang="en-US" smtClean="0"/>
               <a:t>Fourth level</a:t>
             </a:r>
           </a:p>
           <a:p>
             <a:pPr lvl="4"/>
             <a:r>
-              <a:rPr lang="en-US"/>
+              <a:rPr lang="en-US" smtClean="0"/>
               <a:t>Fifth level</a:t>
             </a:r>
             <a:endParaRPr lang="en-IN"/>
@@ -3022,7 +2571,7 @@
           <a:p>
             <a:fld id="{09D18E99-B5C3-45FC-AF5A-D413D846BC60}" type="datetimeFigureOut">
               <a:rPr lang="en-IN" smtClean="0"/>
-              <a:t>06-10-2019</a:t>
+              <a:t>01-10-2019</a:t>
             </a:fld>
             <a:endParaRPr lang="en-IN"/>
           </a:p>
@@ -3478,7 +3027,7 @@
 </p:sld>
 </file>
 
-<file path=ppt/slides/slide10.xml><?xml version="1.0" encoding="utf-8"?>
+<file path=ppt/slides/slide2.xml><?xml version="1.0" encoding="utf-8"?>
 <p:sld xmlns:a="http://schemas.openxmlformats.org/drawingml/2006/main" xmlns:r="http://schemas.openxmlformats.org/officeDocument/2006/relationships" xmlns:p="http://schemas.openxmlformats.org/presentationml/2006/main">
   <p:cSld>
     <p:spTree>
@@ -3495,48 +3044,22 @@
           <a:chExt cx="0" cy="0"/>
         </a:xfrm>
       </p:grpSpPr>
-      <p:sp>
-        <p:nvSpPr>
-          <p:cNvPr id="5" name="Rectangle 4"/>
-          <p:cNvSpPr/>
-          <p:nvPr/>
-        </p:nvSpPr>
-        <p:spPr>
-          <a:xfrm>
-            <a:off x="1276351" y="323850"/>
-            <a:ext cx="9467850" cy="1077218"/>
-          </a:xfrm>
-          <a:prstGeom prst="rect">
-            <a:avLst/>
-          </a:prstGeom>
-        </p:spPr>
-        <p:txBody>
-          <a:bodyPr wrap="square">
-            <a:spAutoFit/>
-          </a:bodyPr>
-          <a:lstStyle/>
-          <a:p>
-            <a:r>
-              <a:rPr lang="en-US" sz="3200" b="1" dirty="0">
-                <a:latin typeface="Times New Roman" panose="02020603050405020304" pitchFamily="18" charset="0"/>
-                <a:cs typeface="Times New Roman" panose="02020603050405020304" pitchFamily="18" charset="0"/>
-              </a:rPr>
-              <a:t>Sequence Diagram For Getting Sales Target By Sales Representatives</a:t>
-            </a:r>
-            <a:endParaRPr lang="en-US" sz="3200" dirty="0"/>
-          </a:p>
-        </p:txBody>
-      </p:sp>
       <p:pic>
         <p:nvPicPr>
-          <p:cNvPr id="33794" name="Picture 2" descr="https://documents.lucidchart.com/documents/b460f2dc-219c-4bc6-a775-77e63ff1cb5e/pages/0_0?a=422&amp;x=27&amp;y=0&amp;w=800&amp;h=1050&amp;store=1&amp;accept=image%2F*&amp;auth=LCA%200418908650cdeff4e5376c2a8eaf40fd1797ef9e-ts%3D1568552867"/>
+          <p:cNvPr id="1028" name="Picture 4" descr="https://documents.lucidchart.com/documents/a1e98e32-fd67-464b-b282-dac8597c6c15/pages/~7PW.lekc_3L?a=2103&amp;x=141&amp;y=64&amp;w=858&amp;h=1232&amp;store=1&amp;accept=image%2F*&amp;auth=LCA%20a89cbd0fb4820f1916f8d27525e0de9916325ea4-ts%3D1569909084"/>
           <p:cNvPicPr>
             <a:picLocks noChangeAspect="1" noChangeArrowheads="1"/>
           </p:cNvPicPr>
           <p:nvPr/>
         </p:nvPicPr>
         <p:blipFill>
-          <a:blip r:embed="rId2"/>
+          <a:blip r:embed="rId2">
+            <a:extLst>
+              <a:ext uri="{28A0092B-C50C-407E-A947-70E740481C1C}">
+                <a14:useLocalDpi xmlns:a14="http://schemas.microsoft.com/office/drawing/2010/main" val="0"/>
+              </a:ext>
+            </a:extLst>
+          </a:blip>
           <a:srcRect/>
           <a:stretch>
             <a:fillRect/>
@@ -3544,19 +3067,28 @@
         </p:blipFill>
         <p:spPr bwMode="auto">
           <a:xfrm>
-            <a:off x="1181100" y="1276350"/>
-            <a:ext cx="10077449" cy="5029200"/>
+            <a:off x="3220795" y="75135"/>
+            <a:ext cx="4727451" cy="6782865"/>
           </a:xfrm>
           <a:prstGeom prst="rect">
             <a:avLst/>
           </a:prstGeom>
           <a:noFill/>
+          <a:extLst>
+            <a:ext uri="{909E8E84-426E-40DD-AFC4-6F175D3DCCD1}">
+              <a14:hiddenFill xmlns:a14="http://schemas.microsoft.com/office/drawing/2010/main">
+                <a:solidFill>
+                  <a:srgbClr val="FFFFFF"/>
+                </a:solidFill>
+              </a14:hiddenFill>
+            </a:ext>
+          </a:extLst>
         </p:spPr>
       </p:pic>
     </p:spTree>
     <p:extLst>
       <p:ext uri="{BB962C8B-B14F-4D97-AF65-F5344CB8AC3E}">
-        <p14:creationId xmlns:p14="http://schemas.microsoft.com/office/powerpoint/2010/main" val="1854167856"/>
+        <p14:creationId xmlns:p14="http://schemas.microsoft.com/office/powerpoint/2010/main" val="68721945"/>
       </p:ext>
     </p:extLst>
   </p:cSld>
@@ -3566,7 +3098,220 @@
 </p:sld>
 </file>
 
-<file path=ppt/slides/slide11.xml><?xml version="1.0" encoding="utf-8"?>
+<file path=ppt/slides/slide3.xml><?xml version="1.0" encoding="utf-8"?>
+<p:sld xmlns:a="http://schemas.openxmlformats.org/drawingml/2006/main" xmlns:r="http://schemas.openxmlformats.org/officeDocument/2006/relationships" xmlns:p="http://schemas.openxmlformats.org/presentationml/2006/main">
+  <p:cSld>
+    <p:spTree>
+      <p:nvGrpSpPr>
+        <p:cNvPr id="1" name=""/>
+        <p:cNvGrpSpPr/>
+        <p:nvPr/>
+      </p:nvGrpSpPr>
+      <p:grpSpPr>
+        <a:xfrm>
+          <a:off x="0" y="0"/>
+          <a:ext cx="0" cy="0"/>
+          <a:chOff x="0" y="0"/>
+          <a:chExt cx="0" cy="0"/>
+        </a:xfrm>
+      </p:grpSpPr>
+      <p:pic>
+        <p:nvPicPr>
+          <p:cNvPr id="1026" name="Picture 2" descr="https://documents.lucidchart.com/documents/a1e98e32-fd67-464b-b282-dac8597c6c15/pages/0_0?a=1597&amp;x=105&amp;y=104&amp;w=770&amp;h=792&amp;store=1&amp;accept=image%2F*&amp;auth=LCA%20395108c8b26200922945c75e6cbb2ff951a66ae4-ts%3D1569909084"/>
+          <p:cNvPicPr>
+            <a:picLocks noChangeAspect="1" noChangeArrowheads="1"/>
+          </p:cNvPicPr>
+          <p:nvPr/>
+        </p:nvPicPr>
+        <p:blipFill>
+          <a:blip r:embed="rId2">
+            <a:extLst>
+              <a:ext uri="{28A0092B-C50C-407E-A947-70E740481C1C}">
+                <a14:useLocalDpi xmlns:a14="http://schemas.microsoft.com/office/drawing/2010/main" val="0"/>
+              </a:ext>
+            </a:extLst>
+          </a:blip>
+          <a:srcRect/>
+          <a:stretch>
+            <a:fillRect/>
+          </a:stretch>
+        </p:blipFill>
+        <p:spPr bwMode="auto">
+          <a:xfrm>
+            <a:off x="2870640" y="900333"/>
+            <a:ext cx="5495925" cy="5657851"/>
+          </a:xfrm>
+          <a:prstGeom prst="rect">
+            <a:avLst/>
+          </a:prstGeom>
+          <a:noFill/>
+          <a:extLst>
+            <a:ext uri="{909E8E84-426E-40DD-AFC4-6F175D3DCCD1}">
+              <a14:hiddenFill xmlns:a14="http://schemas.microsoft.com/office/drawing/2010/main">
+                <a:solidFill>
+                  <a:srgbClr val="FFFFFF"/>
+                </a:solidFill>
+              </a14:hiddenFill>
+            </a:ext>
+          </a:extLst>
+        </p:spPr>
+      </p:pic>
+    </p:spTree>
+    <p:extLst>
+      <p:ext uri="{BB962C8B-B14F-4D97-AF65-F5344CB8AC3E}">
+        <p14:creationId xmlns:p14="http://schemas.microsoft.com/office/powerpoint/2010/main" val="4156712400"/>
+      </p:ext>
+    </p:extLst>
+  </p:cSld>
+  <p:clrMapOvr>
+    <a:masterClrMapping/>
+  </p:clrMapOvr>
+</p:sld>
+</file>
+
+<file path=ppt/slides/slide4.xml><?xml version="1.0" encoding="utf-8"?>
+<p:sld xmlns:a="http://schemas.openxmlformats.org/drawingml/2006/main" xmlns:r="http://schemas.openxmlformats.org/officeDocument/2006/relationships" xmlns:p="http://schemas.openxmlformats.org/presentationml/2006/main">
+  <p:cSld>
+    <p:spTree>
+      <p:nvGrpSpPr>
+        <p:cNvPr id="1" name=""/>
+        <p:cNvGrpSpPr/>
+        <p:nvPr/>
+      </p:nvGrpSpPr>
+      <p:grpSpPr>
+        <a:xfrm>
+          <a:off x="0" y="0"/>
+          <a:ext cx="0" cy="0"/>
+          <a:chOff x="0" y="0"/>
+          <a:chExt cx="0" cy="0"/>
+        </a:xfrm>
+      </p:grpSpPr>
+      <p:pic>
+        <p:nvPicPr>
+          <p:cNvPr id="2052" name="Picture 4" descr="https://documents.lucidchart.com/documents/a1e98e32-fd67-464b-b282-dac8597c6c15/pages/j0PWhM3VBgoU?a=2106&amp;x=152&amp;y=12&amp;w=1160&amp;h=1056&amp;store=1&amp;accept=image%2F*&amp;auth=LCA%2010240bfaad896e3bb5b976499a9854998d8098da-ts%3D1569909084"/>
+          <p:cNvPicPr>
+            <a:picLocks noChangeAspect="1" noChangeArrowheads="1"/>
+          </p:cNvPicPr>
+          <p:nvPr/>
+        </p:nvPicPr>
+        <p:blipFill>
+          <a:blip r:embed="rId2">
+            <a:extLst>
+              <a:ext uri="{28A0092B-C50C-407E-A947-70E740481C1C}">
+                <a14:useLocalDpi xmlns:a14="http://schemas.microsoft.com/office/drawing/2010/main" val="0"/>
+              </a:ext>
+            </a:extLst>
+          </a:blip>
+          <a:srcRect/>
+          <a:stretch>
+            <a:fillRect/>
+          </a:stretch>
+        </p:blipFill>
+        <p:spPr bwMode="auto">
+          <a:xfrm>
+            <a:off x="3051311" y="703384"/>
+            <a:ext cx="6150353" cy="5598942"/>
+          </a:xfrm>
+          <a:prstGeom prst="rect">
+            <a:avLst/>
+          </a:prstGeom>
+          <a:noFill/>
+          <a:extLst>
+            <a:ext uri="{909E8E84-426E-40DD-AFC4-6F175D3DCCD1}">
+              <a14:hiddenFill xmlns:a14="http://schemas.microsoft.com/office/drawing/2010/main">
+                <a:solidFill>
+                  <a:srgbClr val="FFFFFF"/>
+                </a:solidFill>
+              </a14:hiddenFill>
+            </a:ext>
+          </a:extLst>
+        </p:spPr>
+      </p:pic>
+    </p:spTree>
+    <p:extLst>
+      <p:ext uri="{BB962C8B-B14F-4D97-AF65-F5344CB8AC3E}">
+        <p14:creationId xmlns:p14="http://schemas.microsoft.com/office/powerpoint/2010/main" val="3338793307"/>
+      </p:ext>
+    </p:extLst>
+  </p:cSld>
+  <p:clrMapOvr>
+    <a:masterClrMapping/>
+  </p:clrMapOvr>
+</p:sld>
+</file>
+
+<file path=ppt/slides/slide5.xml><?xml version="1.0" encoding="utf-8"?>
+<p:sld xmlns:a="http://schemas.openxmlformats.org/drawingml/2006/main" xmlns:r="http://schemas.openxmlformats.org/officeDocument/2006/relationships" xmlns:p="http://schemas.openxmlformats.org/presentationml/2006/main">
+  <p:cSld>
+    <p:spTree>
+      <p:nvGrpSpPr>
+        <p:cNvPr id="1" name=""/>
+        <p:cNvGrpSpPr/>
+        <p:nvPr/>
+      </p:nvGrpSpPr>
+      <p:grpSpPr>
+        <a:xfrm>
+          <a:off x="0" y="0"/>
+          <a:ext cx="0" cy="0"/>
+          <a:chOff x="0" y="0"/>
+          <a:chExt cx="0" cy="0"/>
+        </a:xfrm>
+      </p:grpSpPr>
+      <p:pic>
+        <p:nvPicPr>
+          <p:cNvPr id="3076" name="Picture 4" descr="https://documents.lucidchart.com/documents/7e305cd1-81d7-4191-87c6-9f4a87e8c278/pages/0_0?a=2541&amp;x=-80&amp;y=-11&amp;w=2203&amp;h=1122&amp;store=1&amp;accept=image%2F*&amp;auth=LCA%2048ac5a617d94e7ab86a042cc2ff7e6349c5eb0b7-ts%3D1569912003"/>
+          <p:cNvPicPr>
+            <a:picLocks noChangeAspect="1" noChangeArrowheads="1"/>
+          </p:cNvPicPr>
+          <p:nvPr/>
+        </p:nvPicPr>
+        <p:blipFill>
+          <a:blip r:embed="rId2">
+            <a:extLst>
+              <a:ext uri="{28A0092B-C50C-407E-A947-70E740481C1C}">
+                <a14:useLocalDpi xmlns:a14="http://schemas.microsoft.com/office/drawing/2010/main" val="0"/>
+              </a:ext>
+            </a:extLst>
+          </a:blip>
+          <a:srcRect/>
+          <a:stretch>
+            <a:fillRect/>
+          </a:stretch>
+        </p:blipFill>
+        <p:spPr bwMode="auto">
+          <a:xfrm>
+            <a:off x="342899" y="690136"/>
+            <a:ext cx="11353801" cy="5786864"/>
+          </a:xfrm>
+          <a:prstGeom prst="rect">
+            <a:avLst/>
+          </a:prstGeom>
+          <a:noFill/>
+          <a:extLst>
+            <a:ext uri="{909E8E84-426E-40DD-AFC4-6F175D3DCCD1}">
+              <a14:hiddenFill xmlns:a14="http://schemas.microsoft.com/office/drawing/2010/main">
+                <a:solidFill>
+                  <a:srgbClr val="FFFFFF"/>
+                </a:solidFill>
+              </a14:hiddenFill>
+            </a:ext>
+          </a:extLst>
+        </p:spPr>
+      </p:pic>
+    </p:spTree>
+    <p:extLst>
+      <p:ext uri="{BB962C8B-B14F-4D97-AF65-F5344CB8AC3E}">
+        <p14:creationId xmlns:p14="http://schemas.microsoft.com/office/powerpoint/2010/main" val="1807234296"/>
+      </p:ext>
+    </p:extLst>
+  </p:cSld>
+  <p:clrMapOvr>
+    <a:masterClrMapping/>
+  </p:clrMapOvr>
+</p:sld>
+</file>
+
+<file path=ppt/slides/slide6.xml><?xml version="1.0" encoding="utf-8"?>
 <p:sld xmlns:a="http://schemas.openxmlformats.org/drawingml/2006/main" xmlns:r="http://schemas.openxmlformats.org/officeDocument/2006/relationships" xmlns:p="http://schemas.openxmlformats.org/presentationml/2006/main">
   <p:cSld>
     <p:spTree>
@@ -3627,7 +3372,7 @@
     </p:spTree>
     <p:extLst>
       <p:ext uri="{BB962C8B-B14F-4D97-AF65-F5344CB8AC3E}">
-        <p14:creationId xmlns:p14="http://schemas.microsoft.com/office/powerpoint/2010/main" val="2635810171"/>
+        <p14:creationId xmlns:p14="http://schemas.microsoft.com/office/powerpoint/2010/main" val="2419734776"/>
       </p:ext>
     </p:extLst>
   </p:cSld>
@@ -3637,646 +3382,7 @@
 </p:sld>
 </file>
 
-<file path=ppt/slides/slide12.xml><?xml version="1.0" encoding="utf-8"?>
-<p:sld xmlns:a="http://schemas.openxmlformats.org/drawingml/2006/main" xmlns:r="http://schemas.openxmlformats.org/officeDocument/2006/relationships" xmlns:p="http://schemas.openxmlformats.org/presentationml/2006/main">
-  <p:cSld>
-    <p:spTree>
-      <p:nvGrpSpPr>
-        <p:cNvPr id="1" name=""/>
-        <p:cNvGrpSpPr/>
-        <p:nvPr/>
-      </p:nvGrpSpPr>
-      <p:grpSpPr>
-        <a:xfrm>
-          <a:off x="0" y="0"/>
-          <a:ext cx="0" cy="0"/>
-          <a:chOff x="0" y="0"/>
-          <a:chExt cx="0" cy="0"/>
-        </a:xfrm>
-      </p:grpSpPr>
-      <p:pic>
-        <p:nvPicPr>
-          <p:cNvPr id="3076" name="Picture 4" descr="https://documents.lucidchart.com/documents/7e305cd1-81d7-4191-87c6-9f4a87e8c278/pages/0_0?a=2541&amp;x=-80&amp;y=-11&amp;w=2203&amp;h=1122&amp;store=1&amp;accept=image%2F*&amp;auth=LCA%2048ac5a617d94e7ab86a042cc2ff7e6349c5eb0b7-ts%3D1569912003"/>
-          <p:cNvPicPr>
-            <a:picLocks noChangeAspect="1" noChangeArrowheads="1"/>
-          </p:cNvPicPr>
-          <p:nvPr/>
-        </p:nvPicPr>
-        <p:blipFill>
-          <a:blip r:embed="rId2">
-            <a:extLst>
-              <a:ext uri="{28A0092B-C50C-407E-A947-70E740481C1C}">
-                <a14:useLocalDpi xmlns:a14="http://schemas.microsoft.com/office/drawing/2010/main" val="0"/>
-              </a:ext>
-            </a:extLst>
-          </a:blip>
-          <a:srcRect/>
-          <a:stretch>
-            <a:fillRect/>
-          </a:stretch>
-        </p:blipFill>
-        <p:spPr bwMode="auto">
-          <a:xfrm>
-            <a:off x="342899" y="690136"/>
-            <a:ext cx="11353801" cy="5786864"/>
-          </a:xfrm>
-          <a:prstGeom prst="rect">
-            <a:avLst/>
-          </a:prstGeom>
-          <a:noFill/>
-          <a:extLst>
-            <a:ext uri="{909E8E84-426E-40DD-AFC4-6F175D3DCCD1}">
-              <a14:hiddenFill xmlns:a14="http://schemas.microsoft.com/office/drawing/2010/main">
-                <a:solidFill>
-                  <a:srgbClr val="FFFFFF"/>
-                </a:solidFill>
-              </a14:hiddenFill>
-            </a:ext>
-          </a:extLst>
-        </p:spPr>
-      </p:pic>
-    </p:spTree>
-    <p:extLst>
-      <p:ext uri="{BB962C8B-B14F-4D97-AF65-F5344CB8AC3E}">
-        <p14:creationId xmlns:p14="http://schemas.microsoft.com/office/powerpoint/2010/main" val="747846121"/>
-      </p:ext>
-    </p:extLst>
-  </p:cSld>
-  <p:clrMapOvr>
-    <a:masterClrMapping/>
-  </p:clrMapOvr>
-</p:sld>
-</file>
-
-<file path=ppt/slides/slide13.xml><?xml version="1.0" encoding="utf-8"?>
-<p:sld xmlns:a="http://schemas.openxmlformats.org/drawingml/2006/main" xmlns:r="http://schemas.openxmlformats.org/officeDocument/2006/relationships" xmlns:p="http://schemas.openxmlformats.org/presentationml/2006/main">
-  <p:cSld>
-    <p:spTree>
-      <p:nvGrpSpPr>
-        <p:cNvPr id="1" name=""/>
-        <p:cNvGrpSpPr/>
-        <p:nvPr/>
-      </p:nvGrpSpPr>
-      <p:grpSpPr>
-        <a:xfrm>
-          <a:off x="0" y="0"/>
-          <a:ext cx="0" cy="0"/>
-          <a:chOff x="0" y="0"/>
-          <a:chExt cx="0" cy="0"/>
-        </a:xfrm>
-      </p:grpSpPr>
-      <p:pic>
-        <p:nvPicPr>
-          <p:cNvPr id="1026" name="Picture 2" descr="https://documents.lucidchart.com/documents/7e305cd1-81d7-4191-87c6-9f4a87e8c278/pages/0_0?a=3471&amp;x=-80&amp;y=-71&amp;w=2203&amp;h=1122&amp;store=1&amp;accept=image%2F*&amp;auth=LCA%201c61ab6922779c57043f73b09fcef7def701c299-ts%3D1570107809"/>
-          <p:cNvPicPr>
-            <a:picLocks noChangeAspect="1" noChangeArrowheads="1"/>
-          </p:cNvPicPr>
-          <p:nvPr/>
-        </p:nvPicPr>
-        <p:blipFill>
-          <a:blip r:embed="rId2">
-            <a:extLst>
-              <a:ext uri="{28A0092B-C50C-407E-A947-70E740481C1C}">
-                <a14:useLocalDpi xmlns:a14="http://schemas.microsoft.com/office/drawing/2010/main" val="0"/>
-              </a:ext>
-            </a:extLst>
-          </a:blip>
-          <a:srcRect/>
-          <a:stretch>
-            <a:fillRect/>
-          </a:stretch>
-        </p:blipFill>
-        <p:spPr bwMode="auto">
-          <a:xfrm>
-            <a:off x="604911" y="956603"/>
-            <a:ext cx="11381620" cy="5083154"/>
-          </a:xfrm>
-          <a:prstGeom prst="rect">
-            <a:avLst/>
-          </a:prstGeom>
-          <a:noFill/>
-          <a:extLst>
-            <a:ext uri="{909E8E84-426E-40DD-AFC4-6F175D3DCCD1}">
-              <a14:hiddenFill xmlns:a14="http://schemas.microsoft.com/office/drawing/2010/main">
-                <a:solidFill>
-                  <a:srgbClr val="FFFFFF"/>
-                </a:solidFill>
-              </a14:hiddenFill>
-            </a:ext>
-          </a:extLst>
-        </p:spPr>
-      </p:pic>
-      <p:sp>
-        <p:nvSpPr>
-          <p:cNvPr id="3" name="TextBox 2"/>
-          <p:cNvSpPr txBox="1"/>
-          <p:nvPr/>
-        </p:nvSpPr>
-        <p:spPr>
-          <a:xfrm>
-            <a:off x="815926" y="239151"/>
-            <a:ext cx="8356209" cy="369332"/>
-          </a:xfrm>
-          <a:prstGeom prst="rect">
-            <a:avLst/>
-          </a:prstGeom>
-          <a:noFill/>
-        </p:spPr>
-        <p:txBody>
-          <a:bodyPr wrap="square" rtlCol="0">
-            <a:spAutoFit/>
-          </a:bodyPr>
-          <a:lstStyle/>
-          <a:p>
-            <a:r>
-              <a:rPr lang="en-US" dirty="0"/>
-              <a:t>Sequence Diagram For Online Return</a:t>
-            </a:r>
-            <a:endParaRPr lang="en-IN" dirty="0"/>
-          </a:p>
-        </p:txBody>
-      </p:sp>
-    </p:spTree>
-    <p:extLst>
-      <p:ext uri="{BB962C8B-B14F-4D97-AF65-F5344CB8AC3E}">
-        <p14:creationId xmlns:p14="http://schemas.microsoft.com/office/powerpoint/2010/main" val="2961156954"/>
-      </p:ext>
-    </p:extLst>
-  </p:cSld>
-  <p:clrMapOvr>
-    <a:masterClrMapping/>
-  </p:clrMapOvr>
-</p:sld>
-</file>
-
-<file path=ppt/slides/slide14.xml><?xml version="1.0" encoding="utf-8"?>
-<p:sld xmlns:a="http://schemas.openxmlformats.org/drawingml/2006/main" xmlns:r="http://schemas.openxmlformats.org/officeDocument/2006/relationships" xmlns:p="http://schemas.openxmlformats.org/presentationml/2006/main">
-  <p:cSld>
-    <p:spTree>
-      <p:nvGrpSpPr>
-        <p:cNvPr id="1" name=""/>
-        <p:cNvGrpSpPr/>
-        <p:nvPr/>
-      </p:nvGrpSpPr>
-      <p:grpSpPr>
-        <a:xfrm>
-          <a:off x="0" y="0"/>
-          <a:ext cx="0" cy="0"/>
-          <a:chOff x="0" y="0"/>
-          <a:chExt cx="0" cy="0"/>
-        </a:xfrm>
-      </p:grpSpPr>
-      <p:sp>
-        <p:nvSpPr>
-          <p:cNvPr id="2" name="Title 1"/>
-          <p:cNvSpPr>
-            <a:spLocks noGrp="1"/>
-          </p:cNvSpPr>
-          <p:nvPr>
-            <p:ph type="title"/>
-          </p:nvPr>
-        </p:nvSpPr>
-        <p:spPr>
-          <a:xfrm>
-            <a:off x="679883" y="0"/>
-            <a:ext cx="10515600" cy="966370"/>
-          </a:xfrm>
-        </p:spPr>
-        <p:txBody>
-          <a:bodyPr/>
-          <a:lstStyle/>
-          <a:p>
-            <a:pPr algn="ctr"/>
-            <a:r>
-              <a:rPr lang="en-US" b="1" dirty="0"/>
-              <a:t>Activity diagram of Login</a:t>
-            </a:r>
-            <a:endParaRPr lang="en-IN" b="1" dirty="0"/>
-          </a:p>
-        </p:txBody>
-      </p:sp>
-      <p:pic>
-        <p:nvPicPr>
-          <p:cNvPr id="1030" name="Picture 6" descr="https://documents.lucidchart.com/documents/af12140d-aed6-42ae-aab6-db1606dd6482/pages/PeNRF1ucIAOW?a=3029&amp;x=105&amp;y=10&amp;w=875&amp;h=660&amp;store=1&amp;accept=image%2F*&amp;auth=LCA%20309c58e935111ef91869c8cf8b367146ecb4b024-ts%3D1570188211"/>
-          <p:cNvPicPr>
-            <a:picLocks noChangeAspect="1" noChangeArrowheads="1"/>
-          </p:cNvPicPr>
-          <p:nvPr/>
-        </p:nvPicPr>
-        <p:blipFill>
-          <a:blip r:embed="rId2">
-            <a:extLst>
-              <a:ext uri="{28A0092B-C50C-407E-A947-70E740481C1C}">
-                <a14:useLocalDpi xmlns:a14="http://schemas.microsoft.com/office/drawing/2010/main" val="0"/>
-              </a:ext>
-            </a:extLst>
-          </a:blip>
-          <a:srcRect/>
-          <a:stretch>
-            <a:fillRect/>
-          </a:stretch>
-        </p:blipFill>
-        <p:spPr bwMode="auto">
-          <a:xfrm>
-            <a:off x="869430" y="749508"/>
-            <a:ext cx="11322570" cy="5756223"/>
-          </a:xfrm>
-          <a:prstGeom prst="rect">
-            <a:avLst/>
-          </a:prstGeom>
-          <a:noFill/>
-          <a:extLst>
-            <a:ext uri="{909E8E84-426E-40DD-AFC4-6F175D3DCCD1}">
-              <a14:hiddenFill xmlns:a14="http://schemas.microsoft.com/office/drawing/2010/main">
-                <a:solidFill>
-                  <a:srgbClr val="FFFFFF"/>
-                </a:solidFill>
-              </a14:hiddenFill>
-            </a:ext>
-          </a:extLst>
-        </p:spPr>
-      </p:pic>
-    </p:spTree>
-    <p:extLst>
-      <p:ext uri="{BB962C8B-B14F-4D97-AF65-F5344CB8AC3E}">
-        <p14:creationId xmlns:p14="http://schemas.microsoft.com/office/powerpoint/2010/main" val="1597218432"/>
-      </p:ext>
-    </p:extLst>
-  </p:cSld>
-  <p:clrMapOvr>
-    <a:masterClrMapping/>
-  </p:clrMapOvr>
-</p:sld>
-</file>
-
-<file path=ppt/slides/slide15.xml><?xml version="1.0" encoding="utf-8"?>
-<p:sld xmlns:a="http://schemas.openxmlformats.org/drawingml/2006/main" xmlns:r="http://schemas.openxmlformats.org/officeDocument/2006/relationships" xmlns:p="http://schemas.openxmlformats.org/presentationml/2006/main">
-  <p:cSld>
-    <p:spTree>
-      <p:nvGrpSpPr>
-        <p:cNvPr id="1" name=""/>
-        <p:cNvGrpSpPr/>
-        <p:nvPr/>
-      </p:nvGrpSpPr>
-      <p:grpSpPr>
-        <a:xfrm>
-          <a:off x="0" y="0"/>
-          <a:ext cx="0" cy="0"/>
-          <a:chOff x="0" y="0"/>
-          <a:chExt cx="0" cy="0"/>
-        </a:xfrm>
-      </p:grpSpPr>
-      <p:sp>
-        <p:nvSpPr>
-          <p:cNvPr id="2" name="Title 1"/>
-          <p:cNvSpPr>
-            <a:spLocks noGrp="1"/>
-          </p:cNvSpPr>
-          <p:nvPr>
-            <p:ph type="title"/>
-          </p:nvPr>
-        </p:nvSpPr>
-        <p:spPr>
-          <a:xfrm>
-            <a:off x="838200" y="1"/>
-            <a:ext cx="10515600" cy="1259173"/>
-          </a:xfrm>
-        </p:spPr>
-        <p:txBody>
-          <a:bodyPr/>
-          <a:lstStyle/>
-          <a:p>
-            <a:r>
-              <a:rPr lang="en-US" b="1" dirty="0"/>
-              <a:t>Activity diagram of Changing Admin Password</a:t>
-            </a:r>
-            <a:endParaRPr lang="en-IN" b="1" dirty="0"/>
-          </a:p>
-        </p:txBody>
-      </p:sp>
-      <p:pic>
-        <p:nvPicPr>
-          <p:cNvPr id="1026" name="Picture 2" descr="https://documents.lucidchart.com/documents/af12140d-aed6-42ae-aab6-db1606dd6482/pages/PeNRF1ucIAOW?a=3761&amp;x=12&amp;y=-20&amp;w=1488&amp;h=628&amp;store=1&amp;accept=image%2F*&amp;auth=LCA%20e717cd61b6310862709950d8b27767567d8b5abe-ts%3D1570198947"/>
-          <p:cNvPicPr>
-            <a:picLocks noChangeAspect="1" noChangeArrowheads="1"/>
-          </p:cNvPicPr>
-          <p:nvPr/>
-        </p:nvPicPr>
-        <p:blipFill rotWithShape="1">
-          <a:blip r:embed="rId2">
-            <a:extLst>
-              <a:ext uri="{28A0092B-C50C-407E-A947-70E740481C1C}">
-                <a14:useLocalDpi xmlns:a14="http://schemas.microsoft.com/office/drawing/2010/main" val="0"/>
-              </a:ext>
-            </a:extLst>
-          </a:blip>
-          <a:srcRect t="3747" r="24795"/>
-          <a:stretch/>
-        </p:blipFill>
-        <p:spPr bwMode="auto">
-          <a:xfrm>
-            <a:off x="0" y="1124262"/>
-            <a:ext cx="11782269" cy="5733737"/>
-          </a:xfrm>
-          <a:prstGeom prst="rect">
-            <a:avLst/>
-          </a:prstGeom>
-          <a:noFill/>
-          <a:extLst>
-            <a:ext uri="{909E8E84-426E-40DD-AFC4-6F175D3DCCD1}">
-              <a14:hiddenFill xmlns:a14="http://schemas.microsoft.com/office/drawing/2010/main">
-                <a:solidFill>
-                  <a:srgbClr val="FFFFFF"/>
-                </a:solidFill>
-              </a14:hiddenFill>
-            </a:ext>
-          </a:extLst>
-        </p:spPr>
-      </p:pic>
-    </p:spTree>
-    <p:extLst>
-      <p:ext uri="{BB962C8B-B14F-4D97-AF65-F5344CB8AC3E}">
-        <p14:creationId xmlns:p14="http://schemas.microsoft.com/office/powerpoint/2010/main" val="3370941213"/>
-      </p:ext>
-    </p:extLst>
-  </p:cSld>
-  <p:clrMapOvr>
-    <a:masterClrMapping/>
-  </p:clrMapOvr>
-</p:sld>
-</file>
-
-<file path=ppt/slides/slide16.xml><?xml version="1.0" encoding="utf-8"?>
-<p:sld xmlns:a="http://schemas.openxmlformats.org/drawingml/2006/main" xmlns:r="http://schemas.openxmlformats.org/officeDocument/2006/relationships" xmlns:p="http://schemas.openxmlformats.org/presentationml/2006/main">
-  <p:cSld>
-    <p:spTree>
-      <p:nvGrpSpPr>
-        <p:cNvPr id="1" name=""/>
-        <p:cNvGrpSpPr/>
-        <p:nvPr/>
-      </p:nvGrpSpPr>
-      <p:grpSpPr>
-        <a:xfrm>
-          <a:off x="0" y="0"/>
-          <a:ext cx="0" cy="0"/>
-          <a:chOff x="0" y="0"/>
-          <a:chExt cx="0" cy="0"/>
-        </a:xfrm>
-      </p:grpSpPr>
-      <p:sp>
-        <p:nvSpPr>
-          <p:cNvPr id="8" name="AutoShape 10" descr="https://documents.lucidchart.com/documents/d3d761a4-85f7-4c0a-a1dd-fa8194f4e105/pages/0_0?a=986&amp;x=-14&amp;y=-9&amp;w=1719&amp;h=953&amp;store=1&amp;accept=image%2F*&amp;auth=LCA%20d3ba455684d78883f00d990c51495ee789a58f7c-ts%3D1569932089"/>
-          <p:cNvSpPr>
-            <a:spLocks noChangeAspect="1" noChangeArrowheads="1"/>
-          </p:cNvSpPr>
-          <p:nvPr/>
-        </p:nvSpPr>
-        <p:spPr bwMode="auto">
-          <a:xfrm>
-            <a:off x="63500" y="-136525"/>
-            <a:ext cx="12277725" cy="6810375"/>
-          </a:xfrm>
-          <a:prstGeom prst="rect">
-            <a:avLst/>
-          </a:prstGeom>
-          <a:noFill/>
-          <a:extLst>
-            <a:ext uri="{909E8E84-426E-40DD-AFC4-6F175D3DCCD1}">
-              <a14:hiddenFill xmlns:a14="http://schemas.microsoft.com/office/drawing/2010/main">
-                <a:solidFill>
-                  <a:srgbClr val="FFFFFF"/>
-                </a:solidFill>
-              </a14:hiddenFill>
-            </a:ext>
-          </a:extLst>
-        </p:spPr>
-        <p:txBody>
-          <a:bodyPr vert="horz" wrap="square" lIns="91440" tIns="45720" rIns="91440" bIns="45720" numCol="1" anchor="t" anchorCtr="0" compatLnSpc="1">
-            <a:prstTxWarp prst="textNoShape">
-              <a:avLst/>
-            </a:prstTxWarp>
-          </a:bodyPr>
-          <a:lstStyle/>
-          <a:p>
-            <a:endParaRPr lang="en-IN"/>
-          </a:p>
-        </p:txBody>
-      </p:sp>
-      <p:sp>
-        <p:nvSpPr>
-          <p:cNvPr id="10" name="AutoShape 14" descr="https://documents.lucidchart.com/documents/d3d761a4-85f7-4c0a-a1dd-fa8194f4e105/pages/0_0?a=986&amp;x=-14&amp;y=-9&amp;w=1719&amp;h=953&amp;store=1&amp;accept=image%2F*&amp;auth=LCA%20d3ba455684d78883f00d990c51495ee789a58f7c-ts%3D1569932089"/>
-          <p:cNvSpPr>
-            <a:spLocks noChangeAspect="1" noChangeArrowheads="1"/>
-          </p:cNvSpPr>
-          <p:nvPr/>
-        </p:nvSpPr>
-        <p:spPr bwMode="auto">
-          <a:xfrm>
-            <a:off x="215900" y="15875"/>
-            <a:ext cx="12277725" cy="6810375"/>
-          </a:xfrm>
-          <a:prstGeom prst="rect">
-            <a:avLst/>
-          </a:prstGeom>
-          <a:noFill/>
-          <a:extLst>
-            <a:ext uri="{909E8E84-426E-40DD-AFC4-6F175D3DCCD1}">
-              <a14:hiddenFill xmlns:a14="http://schemas.microsoft.com/office/drawing/2010/main">
-                <a:solidFill>
-                  <a:srgbClr val="FFFFFF"/>
-                </a:solidFill>
-              </a14:hiddenFill>
-            </a:ext>
-          </a:extLst>
-        </p:spPr>
-        <p:txBody>
-          <a:bodyPr vert="horz" wrap="square" lIns="91440" tIns="45720" rIns="91440" bIns="45720" numCol="1" anchor="t" anchorCtr="0" compatLnSpc="1">
-            <a:prstTxWarp prst="textNoShape">
-              <a:avLst/>
-            </a:prstTxWarp>
-          </a:bodyPr>
-          <a:lstStyle/>
-          <a:p>
-            <a:endParaRPr lang="en-IN"/>
-          </a:p>
-        </p:txBody>
-      </p:sp>
-      <p:pic>
-        <p:nvPicPr>
-          <p:cNvPr id="2" name="Picture 1"/>
-          <p:cNvPicPr>
-            <a:picLocks noChangeAspect="1"/>
-          </p:cNvPicPr>
-          <p:nvPr/>
-        </p:nvPicPr>
-        <p:blipFill>
-          <a:blip r:embed="rId2" cstate="print">
-            <a:extLst>
-              <a:ext uri="{28A0092B-C50C-407E-A947-70E740481C1C}">
-                <a14:useLocalDpi xmlns:a14="http://schemas.microsoft.com/office/drawing/2010/main" val="0"/>
-              </a:ext>
-            </a:extLst>
-          </a:blip>
-          <a:stretch>
-            <a:fillRect/>
-          </a:stretch>
-        </p:blipFill>
-        <p:spPr>
-          <a:xfrm>
-            <a:off x="3759412" y="524535"/>
-            <a:ext cx="5401056" cy="5190744"/>
-          </a:xfrm>
-          <a:prstGeom prst="rect">
-            <a:avLst/>
-          </a:prstGeom>
-        </p:spPr>
-      </p:pic>
-    </p:spTree>
-    <p:extLst>
-      <p:ext uri="{BB962C8B-B14F-4D97-AF65-F5344CB8AC3E}">
-        <p14:creationId xmlns:p14="http://schemas.microsoft.com/office/powerpoint/2010/main" val="999969381"/>
-      </p:ext>
-    </p:extLst>
-  </p:cSld>
-  <p:clrMapOvr>
-    <a:masterClrMapping/>
-  </p:clrMapOvr>
-</p:sld>
-</file>
-
-<file path=ppt/slides/slide17.xml><?xml version="1.0" encoding="utf-8"?>
-<p:sld xmlns:a="http://schemas.openxmlformats.org/drawingml/2006/main" xmlns:r="http://schemas.openxmlformats.org/officeDocument/2006/relationships" xmlns:p="http://schemas.openxmlformats.org/presentationml/2006/main">
-  <p:cSld>
-    <p:spTree>
-      <p:nvGrpSpPr>
-        <p:cNvPr id="1" name=""/>
-        <p:cNvGrpSpPr/>
-        <p:nvPr/>
-      </p:nvGrpSpPr>
-      <p:grpSpPr>
-        <a:xfrm>
-          <a:off x="0" y="0"/>
-          <a:ext cx="0" cy="0"/>
-          <a:chOff x="0" y="0"/>
-          <a:chExt cx="0" cy="0"/>
-        </a:xfrm>
-      </p:grpSpPr>
-      <p:pic>
-        <p:nvPicPr>
-          <p:cNvPr id="2" name="Content Placeholder 3">
-            <a:extLst>
-              <a:ext uri="{FF2B5EF4-FFF2-40B4-BE49-F238E27FC236}">
-                <a16:creationId xmlns:a16="http://schemas.microsoft.com/office/drawing/2014/main" id="{C42AD650-0810-4617-8F1F-FC4D908FF73B}"/>
-              </a:ext>
-            </a:extLst>
-          </p:cNvPr>
-          <p:cNvPicPr>
-            <a:picLocks noChangeAspect="1"/>
-          </p:cNvPicPr>
-          <p:nvPr/>
-        </p:nvPicPr>
-        <p:blipFill>
-          <a:blip r:embed="rId2" cstate="print">
-            <a:extLst>
-              <a:ext uri="{28A0092B-C50C-407E-A947-70E740481C1C}">
-                <a14:useLocalDpi xmlns:a14="http://schemas.microsoft.com/office/drawing/2010/main" val="0"/>
-              </a:ext>
-            </a:extLst>
-          </a:blip>
-          <a:stretch>
-            <a:fillRect/>
-          </a:stretch>
-        </p:blipFill>
-        <p:spPr>
-          <a:xfrm>
-            <a:off x="2713002" y="1253331"/>
-            <a:ext cx="6765996" cy="4351338"/>
-          </a:xfrm>
-          <a:prstGeom prst="rect">
-            <a:avLst/>
-          </a:prstGeom>
-        </p:spPr>
-      </p:pic>
-    </p:spTree>
-    <p:extLst>
-      <p:ext uri="{BB962C8B-B14F-4D97-AF65-F5344CB8AC3E}">
-        <p14:creationId xmlns:p14="http://schemas.microsoft.com/office/powerpoint/2010/main" val="1795774031"/>
-      </p:ext>
-    </p:extLst>
-  </p:cSld>
-  <p:clrMapOvr>
-    <a:masterClrMapping/>
-  </p:clrMapOvr>
-</p:sld>
-</file>
-
-<file path=ppt/slides/slide18.xml><?xml version="1.0" encoding="utf-8"?>
-<p:sld xmlns:a="http://schemas.openxmlformats.org/drawingml/2006/main" xmlns:r="http://schemas.openxmlformats.org/officeDocument/2006/relationships" xmlns:p="http://schemas.openxmlformats.org/presentationml/2006/main">
-  <p:cSld>
-    <p:spTree>
-      <p:nvGrpSpPr>
-        <p:cNvPr id="1" name=""/>
-        <p:cNvGrpSpPr/>
-        <p:nvPr/>
-      </p:nvGrpSpPr>
-      <p:grpSpPr>
-        <a:xfrm>
-          <a:off x="0" y="0"/>
-          <a:ext cx="0" cy="0"/>
-          <a:chOff x="0" y="0"/>
-          <a:chExt cx="0" cy="0"/>
-        </a:xfrm>
-      </p:grpSpPr>
-      <p:pic>
-        <p:nvPicPr>
-          <p:cNvPr id="2" name="Content Placeholder 3">
-            <a:extLst>
-              <a:ext uri="{FF2B5EF4-FFF2-40B4-BE49-F238E27FC236}">
-                <a16:creationId xmlns:a16="http://schemas.microsoft.com/office/drawing/2014/main" id="{E715B28C-C2C5-49FD-AE1B-8A464FB9C70A}"/>
-              </a:ext>
-            </a:extLst>
-          </p:cNvPr>
-          <p:cNvPicPr>
-            <a:picLocks noChangeAspect="1"/>
-          </p:cNvPicPr>
-          <p:nvPr/>
-        </p:nvPicPr>
-        <p:blipFill>
-          <a:blip r:embed="rId2" cstate="print">
-            <a:extLst>
-              <a:ext uri="{28A0092B-C50C-407E-A947-70E740481C1C}">
-                <a14:useLocalDpi xmlns:a14="http://schemas.microsoft.com/office/drawing/2010/main" val="0"/>
-              </a:ext>
-            </a:extLst>
-          </a:blip>
-          <a:stretch>
-            <a:fillRect/>
-          </a:stretch>
-        </p:blipFill>
-        <p:spPr>
-          <a:xfrm>
-            <a:off x="1006804" y="837126"/>
-            <a:ext cx="10633883" cy="5586129"/>
-          </a:xfrm>
-          <a:prstGeom prst="rect">
-            <a:avLst/>
-          </a:prstGeom>
-        </p:spPr>
-      </p:pic>
-    </p:spTree>
-    <p:extLst>
-      <p:ext uri="{BB962C8B-B14F-4D97-AF65-F5344CB8AC3E}">
-        <p14:creationId xmlns:p14="http://schemas.microsoft.com/office/powerpoint/2010/main" val="2909726740"/>
-      </p:ext>
-    </p:extLst>
-  </p:cSld>
-  <p:clrMapOvr>
-    <a:masterClrMapping/>
-  </p:clrMapOvr>
-</p:sld>
-</file>
-
-<file path=ppt/slides/slide19.xml><?xml version="1.0" encoding="utf-8"?>
+<file path=ppt/slides/slide7.xml><?xml version="1.0" encoding="utf-8"?>
 <p:sld xmlns:a="http://schemas.openxmlformats.org/drawingml/2006/main" xmlns:r="http://schemas.openxmlformats.org/officeDocument/2006/relationships" xmlns:p="http://schemas.openxmlformats.org/presentationml/2006/main">
   <p:cSld>
     <p:spTree>
@@ -4334,804 +3440,10 @@
           </a:extLst>
         </p:spPr>
       </p:pic>
-      <p:sp>
-        <p:nvSpPr>
-          <p:cNvPr id="2" name="TextBox 1">
-            <a:extLst>
-              <a:ext uri="{FF2B5EF4-FFF2-40B4-BE49-F238E27FC236}">
-                <a16:creationId xmlns:a16="http://schemas.microsoft.com/office/drawing/2014/main" id="{86A25AE9-D028-4A1E-8AE4-1665C95D7CF8}"/>
-              </a:ext>
-            </a:extLst>
-          </p:cNvPr>
-          <p:cNvSpPr txBox="1"/>
-          <p:nvPr/>
-        </p:nvSpPr>
-        <p:spPr>
-          <a:xfrm>
-            <a:off x="1094704" y="811369"/>
-            <a:ext cx="7778840" cy="369332"/>
-          </a:xfrm>
-          <a:prstGeom prst="rect">
-            <a:avLst/>
-          </a:prstGeom>
-          <a:noFill/>
-        </p:spPr>
-        <p:txBody>
-          <a:bodyPr wrap="square" rtlCol="0">
-            <a:spAutoFit/>
-          </a:bodyPr>
-          <a:lstStyle/>
-          <a:p>
-            <a:r>
-              <a:rPr lang="en-IN" dirty="0"/>
-              <a:t>Activity diagram for Order Initializing:</a:t>
-            </a:r>
-          </a:p>
-        </p:txBody>
-      </p:sp>
     </p:spTree>
     <p:extLst>
       <p:ext uri="{BB962C8B-B14F-4D97-AF65-F5344CB8AC3E}">
         <p14:creationId xmlns:p14="http://schemas.microsoft.com/office/powerpoint/2010/main" val="1077092349"/>
-      </p:ext>
-    </p:extLst>
-  </p:cSld>
-  <p:clrMapOvr>
-    <a:masterClrMapping/>
-  </p:clrMapOvr>
-</p:sld>
-</file>
-
-<file path=ppt/slides/slide2.xml><?xml version="1.0" encoding="utf-8"?>
-<p:sld xmlns:a="http://schemas.openxmlformats.org/drawingml/2006/main" xmlns:r="http://schemas.openxmlformats.org/officeDocument/2006/relationships" xmlns:p="http://schemas.openxmlformats.org/presentationml/2006/main">
-  <p:cSld>
-    <p:spTree>
-      <p:nvGrpSpPr>
-        <p:cNvPr id="1" name=""/>
-        <p:cNvGrpSpPr/>
-        <p:nvPr/>
-      </p:nvGrpSpPr>
-      <p:grpSpPr>
-        <a:xfrm>
-          <a:off x="0" y="0"/>
-          <a:ext cx="0" cy="0"/>
-          <a:chOff x="0" y="0"/>
-          <a:chExt cx="0" cy="0"/>
-        </a:xfrm>
-      </p:grpSpPr>
-      <p:pic>
-        <p:nvPicPr>
-          <p:cNvPr id="3074" name="Picture 2" descr="https://documents.lucidchart.com/documents/a1e98e32-fd67-464b-b282-dac8597c6c15/pages/~7PW.lekc_3L?a=2201&amp;x=213&amp;y=64&amp;w=1034&amp;h=1232&amp;store=1&amp;accept=image%2F*&amp;auth=LCA%20d9d64479b3c78416dcbf90fa5c0a570f441b9273-ts%3D1570274340"/>
-          <p:cNvPicPr>
-            <a:picLocks noChangeAspect="1" noChangeArrowheads="1"/>
-          </p:cNvPicPr>
-          <p:nvPr/>
-        </p:nvPicPr>
-        <p:blipFill>
-          <a:blip r:embed="rId2">
-            <a:extLst>
-              <a:ext uri="{28A0092B-C50C-407E-A947-70E740481C1C}">
-                <a14:useLocalDpi xmlns:a14="http://schemas.microsoft.com/office/drawing/2010/main" val="0"/>
-              </a:ext>
-            </a:extLst>
-          </a:blip>
-          <a:srcRect/>
-          <a:stretch>
-            <a:fillRect/>
-          </a:stretch>
-        </p:blipFill>
-        <p:spPr bwMode="auto">
-          <a:xfrm>
-            <a:off x="3222331" y="104652"/>
-            <a:ext cx="5281766" cy="6289114"/>
-          </a:xfrm>
-          <a:prstGeom prst="rect">
-            <a:avLst/>
-          </a:prstGeom>
-          <a:noFill/>
-          <a:extLst>
-            <a:ext uri="{909E8E84-426E-40DD-AFC4-6F175D3DCCD1}">
-              <a14:hiddenFill xmlns:a14="http://schemas.microsoft.com/office/drawing/2010/main">
-                <a:solidFill>
-                  <a:srgbClr val="FFFFFF"/>
-                </a:solidFill>
-              </a14:hiddenFill>
-            </a:ext>
-          </a:extLst>
-        </p:spPr>
-      </p:pic>
-    </p:spTree>
-    <p:extLst>
-      <p:ext uri="{BB962C8B-B14F-4D97-AF65-F5344CB8AC3E}">
-        <p14:creationId xmlns:p14="http://schemas.microsoft.com/office/powerpoint/2010/main" val="68721945"/>
-      </p:ext>
-    </p:extLst>
-  </p:cSld>
-  <p:clrMapOvr>
-    <a:masterClrMapping/>
-  </p:clrMapOvr>
-</p:sld>
-</file>
-
-<file path=ppt/slides/slide20.xml><?xml version="1.0" encoding="utf-8"?>
-<p:sld xmlns:a="http://schemas.openxmlformats.org/drawingml/2006/main" xmlns:r="http://schemas.openxmlformats.org/officeDocument/2006/relationships" xmlns:p="http://schemas.openxmlformats.org/presentationml/2006/main">
-  <p:cSld>
-    <p:spTree>
-      <p:nvGrpSpPr>
-        <p:cNvPr id="1" name=""/>
-        <p:cNvGrpSpPr/>
-        <p:nvPr/>
-      </p:nvGrpSpPr>
-      <p:grpSpPr>
-        <a:xfrm>
-          <a:off x="0" y="0"/>
-          <a:ext cx="0" cy="0"/>
-          <a:chOff x="0" y="0"/>
-          <a:chExt cx="0" cy="0"/>
-        </a:xfrm>
-      </p:grpSpPr>
-      <p:pic>
-        <p:nvPicPr>
-          <p:cNvPr id="1026" name="Picture 2" descr="https://documents.lucidchart.com/documents/d366455b-08d0-412e-9604-7000d4bd7087/pages/saSWjGW1vwpR?a=1143&amp;x=105&amp;y=-4&amp;w=1210&amp;h=884&amp;store=1&amp;accept=image%2F*&amp;auth=LCA%2005a29ebf857c139cb8201f08c5664bae9c548209-ts%3D1570105040"/>
-          <p:cNvPicPr>
-            <a:picLocks noChangeAspect="1" noChangeArrowheads="1"/>
-          </p:cNvPicPr>
-          <p:nvPr/>
-        </p:nvPicPr>
-        <p:blipFill>
-          <a:blip r:embed="rId2">
-            <a:extLst>
-              <a:ext uri="{28A0092B-C50C-407E-A947-70E740481C1C}">
-                <a14:useLocalDpi xmlns:a14="http://schemas.microsoft.com/office/drawing/2010/main" val="0"/>
-              </a:ext>
-            </a:extLst>
-          </a:blip>
-          <a:srcRect/>
-          <a:stretch>
-            <a:fillRect/>
-          </a:stretch>
-        </p:blipFill>
-        <p:spPr bwMode="auto">
-          <a:xfrm>
-            <a:off x="2109455" y="1197734"/>
-            <a:ext cx="7330759" cy="5352747"/>
-          </a:xfrm>
-          <a:prstGeom prst="rect">
-            <a:avLst/>
-          </a:prstGeom>
-          <a:noFill/>
-          <a:extLst>
-            <a:ext uri="{909E8E84-426E-40DD-AFC4-6F175D3DCCD1}">
-              <a14:hiddenFill xmlns:a14="http://schemas.microsoft.com/office/drawing/2010/main">
-                <a:solidFill>
-                  <a:srgbClr val="FFFFFF"/>
-                </a:solidFill>
-              </a14:hiddenFill>
-            </a:ext>
-          </a:extLst>
-        </p:spPr>
-      </p:pic>
-      <p:sp>
-        <p:nvSpPr>
-          <p:cNvPr id="3" name="TextBox 2">
-            <a:extLst>
-              <a:ext uri="{FF2B5EF4-FFF2-40B4-BE49-F238E27FC236}">
-                <a16:creationId xmlns:a16="http://schemas.microsoft.com/office/drawing/2014/main" id="{A3F0AA1A-CBD8-4F99-B25A-D1601A6F33C4}"/>
-              </a:ext>
-            </a:extLst>
-          </p:cNvPr>
-          <p:cNvSpPr txBox="1"/>
-          <p:nvPr/>
-        </p:nvSpPr>
-        <p:spPr>
-          <a:xfrm>
-            <a:off x="1094704" y="811369"/>
-            <a:ext cx="7778840" cy="369332"/>
-          </a:xfrm>
-          <a:prstGeom prst="rect">
-            <a:avLst/>
-          </a:prstGeom>
-          <a:noFill/>
-        </p:spPr>
-        <p:txBody>
-          <a:bodyPr wrap="square" rtlCol="0">
-            <a:spAutoFit/>
-          </a:bodyPr>
-          <a:lstStyle/>
-          <a:p>
-            <a:r>
-              <a:rPr lang="en-IN" dirty="0"/>
-              <a:t>Activity diagram for Order Cancelling:</a:t>
-            </a:r>
-          </a:p>
-        </p:txBody>
-      </p:sp>
-    </p:spTree>
-    <p:extLst>
-      <p:ext uri="{BB962C8B-B14F-4D97-AF65-F5344CB8AC3E}">
-        <p14:creationId xmlns:p14="http://schemas.microsoft.com/office/powerpoint/2010/main" val="1951549789"/>
-      </p:ext>
-    </p:extLst>
-  </p:cSld>
-  <p:clrMapOvr>
-    <a:masterClrMapping/>
-  </p:clrMapOvr>
-</p:sld>
-</file>
-
-<file path=ppt/slides/slide21.xml><?xml version="1.0" encoding="utf-8"?>
-<p:sld xmlns:a="http://schemas.openxmlformats.org/drawingml/2006/main" xmlns:r="http://schemas.openxmlformats.org/officeDocument/2006/relationships" xmlns:p="http://schemas.openxmlformats.org/presentationml/2006/main">
-  <p:cSld>
-    <p:spTree>
-      <p:nvGrpSpPr>
-        <p:cNvPr id="1" name=""/>
-        <p:cNvGrpSpPr/>
-        <p:nvPr/>
-      </p:nvGrpSpPr>
-      <p:grpSpPr>
-        <a:xfrm>
-          <a:off x="0" y="0"/>
-          <a:ext cx="0" cy="0"/>
-          <a:chOff x="0" y="0"/>
-          <a:chExt cx="0" cy="0"/>
-        </a:xfrm>
-      </p:grpSpPr>
-      <p:pic>
-        <p:nvPicPr>
-          <p:cNvPr id="2" name="Picture 1"/>
-          <p:cNvPicPr>
-            <a:picLocks noChangeAspect="1"/>
-          </p:cNvPicPr>
-          <p:nvPr/>
-        </p:nvPicPr>
-        <p:blipFill>
-          <a:blip r:embed="rId2"/>
-          <a:stretch>
-            <a:fillRect/>
-          </a:stretch>
-        </p:blipFill>
-        <p:spPr>
-          <a:xfrm>
-            <a:off x="0" y="1182202"/>
-            <a:ext cx="12192000" cy="5310038"/>
-          </a:xfrm>
-          <a:prstGeom prst="rect">
-            <a:avLst/>
-          </a:prstGeom>
-        </p:spPr>
-      </p:pic>
-      <p:sp>
-        <p:nvSpPr>
-          <p:cNvPr id="3" name="TextBox 2"/>
-          <p:cNvSpPr txBox="1"/>
-          <p:nvPr/>
-        </p:nvSpPr>
-        <p:spPr>
-          <a:xfrm>
-            <a:off x="1491175" y="365760"/>
-            <a:ext cx="8890782" cy="646331"/>
-          </a:xfrm>
-          <a:prstGeom prst="rect">
-            <a:avLst/>
-          </a:prstGeom>
-          <a:noFill/>
-        </p:spPr>
-        <p:txBody>
-          <a:bodyPr wrap="square" rtlCol="0">
-            <a:spAutoFit/>
-          </a:bodyPr>
-          <a:lstStyle/>
-          <a:p>
-            <a:r>
-              <a:rPr lang="en-US" dirty="0"/>
-              <a:t>Activity Diagram For Sales Person Detail</a:t>
-            </a:r>
-          </a:p>
-          <a:p>
-            <a:endParaRPr lang="en-IN" dirty="0"/>
-          </a:p>
-        </p:txBody>
-      </p:sp>
-    </p:spTree>
-    <p:extLst>
-      <p:ext uri="{BB962C8B-B14F-4D97-AF65-F5344CB8AC3E}">
-        <p14:creationId xmlns:p14="http://schemas.microsoft.com/office/powerpoint/2010/main" val="802915780"/>
-      </p:ext>
-    </p:extLst>
-  </p:cSld>
-  <p:clrMapOvr>
-    <a:masterClrMapping/>
-  </p:clrMapOvr>
-</p:sld>
-</file>
-
-<file path=ppt/slides/slide22.xml><?xml version="1.0" encoding="utf-8"?>
-<p:sld xmlns:a="http://schemas.openxmlformats.org/drawingml/2006/main" xmlns:r="http://schemas.openxmlformats.org/officeDocument/2006/relationships" xmlns:p="http://schemas.openxmlformats.org/presentationml/2006/main">
-  <p:cSld>
-    <p:spTree>
-      <p:nvGrpSpPr>
-        <p:cNvPr id="1" name=""/>
-        <p:cNvGrpSpPr/>
-        <p:nvPr/>
-      </p:nvGrpSpPr>
-      <p:grpSpPr>
-        <a:xfrm>
-          <a:off x="0" y="0"/>
-          <a:ext cx="0" cy="0"/>
-          <a:chOff x="0" y="0"/>
-          <a:chExt cx="0" cy="0"/>
-        </a:xfrm>
-      </p:grpSpPr>
-      <p:pic>
-        <p:nvPicPr>
-          <p:cNvPr id="2050" name="Picture 2" descr="https://documents.lucidchart.com/documents/82d4d1ef-016a-4584-b987-982988699c7f/pages/saSWjGW1vwpR?a=373&amp;x=101&amp;y=-24&amp;w=1298&amp;h=1476&amp;store=1&amp;accept=image%2F*&amp;auth=LCA%20590bd94d71e474bc2878f2f2745bdcd7e4ef4021-ts%3D1570276574"/>
-          <p:cNvPicPr>
-            <a:picLocks noChangeAspect="1" noChangeArrowheads="1"/>
-          </p:cNvPicPr>
-          <p:nvPr/>
-        </p:nvPicPr>
-        <p:blipFill>
-          <a:blip r:embed="rId2">
-            <a:extLst>
-              <a:ext uri="{28A0092B-C50C-407E-A947-70E740481C1C}">
-                <a14:useLocalDpi xmlns:a14="http://schemas.microsoft.com/office/drawing/2010/main" val="0"/>
-              </a:ext>
-            </a:extLst>
-          </a:blip>
-          <a:srcRect/>
-          <a:stretch>
-            <a:fillRect/>
-          </a:stretch>
-        </p:blipFill>
-        <p:spPr bwMode="auto">
-          <a:xfrm>
-            <a:off x="889416" y="629586"/>
-            <a:ext cx="11302584" cy="5923981"/>
-          </a:xfrm>
-          <a:prstGeom prst="rect">
-            <a:avLst/>
-          </a:prstGeom>
-          <a:noFill/>
-          <a:extLst>
-            <a:ext uri="{909E8E84-426E-40DD-AFC4-6F175D3DCCD1}">
-              <a14:hiddenFill xmlns:a14="http://schemas.microsoft.com/office/drawing/2010/main">
-                <a:solidFill>
-                  <a:srgbClr val="FFFFFF"/>
-                </a:solidFill>
-              </a14:hiddenFill>
-            </a:ext>
-          </a:extLst>
-        </p:spPr>
-      </p:pic>
-      <p:sp>
-        <p:nvSpPr>
-          <p:cNvPr id="3" name="TextBox 2"/>
-          <p:cNvSpPr txBox="1"/>
-          <p:nvPr/>
-        </p:nvSpPr>
-        <p:spPr>
-          <a:xfrm>
-            <a:off x="889416" y="98474"/>
-            <a:ext cx="9844233" cy="369332"/>
-          </a:xfrm>
-          <a:prstGeom prst="rect">
-            <a:avLst/>
-          </a:prstGeom>
-          <a:noFill/>
-        </p:spPr>
-        <p:txBody>
-          <a:bodyPr wrap="square" rtlCol="0">
-            <a:spAutoFit/>
-          </a:bodyPr>
-          <a:lstStyle/>
-          <a:p>
-            <a:r>
-              <a:rPr lang="en-US" dirty="0"/>
-              <a:t>Activity Diagram for Online Return</a:t>
-            </a:r>
-            <a:endParaRPr lang="en-IN" dirty="0"/>
-          </a:p>
-        </p:txBody>
-      </p:sp>
-    </p:spTree>
-    <p:extLst>
-      <p:ext uri="{BB962C8B-B14F-4D97-AF65-F5344CB8AC3E}">
-        <p14:creationId xmlns:p14="http://schemas.microsoft.com/office/powerpoint/2010/main" val="3548907070"/>
-      </p:ext>
-    </p:extLst>
-  </p:cSld>
-  <p:clrMapOvr>
-    <a:masterClrMapping/>
-  </p:clrMapOvr>
-</p:sld>
-</file>
-
-<file path=ppt/slides/slide3.xml><?xml version="1.0" encoding="utf-8"?>
-<p:sld xmlns:a="http://schemas.openxmlformats.org/drawingml/2006/main" xmlns:r="http://schemas.openxmlformats.org/officeDocument/2006/relationships" xmlns:p="http://schemas.openxmlformats.org/presentationml/2006/main">
-  <p:cSld>
-    <p:spTree>
-      <p:nvGrpSpPr>
-        <p:cNvPr id="1" name=""/>
-        <p:cNvGrpSpPr/>
-        <p:nvPr/>
-      </p:nvGrpSpPr>
-      <p:grpSpPr>
-        <a:xfrm>
-          <a:off x="0" y="0"/>
-          <a:ext cx="0" cy="0"/>
-          <a:chOff x="0" y="0"/>
-          <a:chExt cx="0" cy="0"/>
-        </a:xfrm>
-      </p:grpSpPr>
-      <p:pic>
-        <p:nvPicPr>
-          <p:cNvPr id="2" name="Picture 2" descr="https://documents.lucidchart.com/documents/a1e98e32-fd67-464b-b282-dac8597c6c15/pages/0_0?a=2129&amp;x=93&amp;y=104&amp;w=1034&amp;h=792&amp;store=1&amp;accept=image%2F*&amp;auth=LCA%2079fad50444792ba0a50edcc611463ae41142806e-ts%3D1570274340"/>
-          <p:cNvPicPr>
-            <a:picLocks noChangeAspect="1" noChangeArrowheads="1"/>
-          </p:cNvPicPr>
-          <p:nvPr/>
-        </p:nvPicPr>
-        <p:blipFill>
-          <a:blip r:embed="rId2">
-            <a:extLst>
-              <a:ext uri="{28A0092B-C50C-407E-A947-70E740481C1C}">
-                <a14:useLocalDpi xmlns:a14="http://schemas.microsoft.com/office/drawing/2010/main" val="0"/>
-              </a:ext>
-            </a:extLst>
-          </a:blip>
-          <a:srcRect/>
-          <a:stretch>
-            <a:fillRect/>
-          </a:stretch>
-        </p:blipFill>
-        <p:spPr bwMode="auto">
-          <a:xfrm>
-            <a:off x="2265729" y="480329"/>
-            <a:ext cx="7391400" cy="5657851"/>
-          </a:xfrm>
-          <a:prstGeom prst="rect">
-            <a:avLst/>
-          </a:prstGeom>
-          <a:noFill/>
-          <a:extLst>
-            <a:ext uri="{909E8E84-426E-40DD-AFC4-6F175D3DCCD1}">
-              <a14:hiddenFill xmlns:a14="http://schemas.microsoft.com/office/drawing/2010/main">
-                <a:solidFill>
-                  <a:srgbClr val="FFFFFF"/>
-                </a:solidFill>
-              </a14:hiddenFill>
-            </a:ext>
-          </a:extLst>
-        </p:spPr>
-      </p:pic>
-    </p:spTree>
-    <p:extLst>
-      <p:ext uri="{BB962C8B-B14F-4D97-AF65-F5344CB8AC3E}">
-        <p14:creationId xmlns:p14="http://schemas.microsoft.com/office/powerpoint/2010/main" val="4156712400"/>
-      </p:ext>
-    </p:extLst>
-  </p:cSld>
-  <p:clrMapOvr>
-    <a:masterClrMapping/>
-  </p:clrMapOvr>
-</p:sld>
-</file>
-
-<file path=ppt/slides/slide4.xml><?xml version="1.0" encoding="utf-8"?>
-<p:sld xmlns:a="http://schemas.openxmlformats.org/drawingml/2006/main" xmlns:r="http://schemas.openxmlformats.org/officeDocument/2006/relationships" xmlns:p="http://schemas.openxmlformats.org/presentationml/2006/main">
-  <p:cSld>
-    <p:spTree>
-      <p:nvGrpSpPr>
-        <p:cNvPr id="1" name=""/>
-        <p:cNvGrpSpPr/>
-        <p:nvPr/>
-      </p:nvGrpSpPr>
-      <p:grpSpPr>
-        <a:xfrm>
-          <a:off x="0" y="0"/>
-          <a:ext cx="0" cy="0"/>
-          <a:chOff x="0" y="0"/>
-          <a:chExt cx="0" cy="0"/>
-        </a:xfrm>
-      </p:grpSpPr>
-      <p:pic>
-        <p:nvPicPr>
-          <p:cNvPr id="2" name="Picture 4" descr="https://documents.lucidchart.com/documents/a1e98e32-fd67-464b-b282-dac8597c6c15/pages/j0PWhM3VBgoU?a=2165&amp;x=152&amp;y=14&amp;w=1160&amp;h=1012&amp;store=1&amp;accept=image%2F*&amp;auth=LCA%20f9cd1337b5b853ba2da7fbd3d8bcc80b158b8af0-ts%3D1570274340"/>
-          <p:cNvPicPr>
-            <a:picLocks noChangeAspect="1" noChangeArrowheads="1"/>
-          </p:cNvPicPr>
-          <p:nvPr/>
-        </p:nvPicPr>
-        <p:blipFill>
-          <a:blip r:embed="rId2">
-            <a:extLst>
-              <a:ext uri="{28A0092B-C50C-407E-A947-70E740481C1C}">
-                <a14:useLocalDpi xmlns:a14="http://schemas.microsoft.com/office/drawing/2010/main" val="0"/>
-              </a:ext>
-            </a:extLst>
-          </a:blip>
-          <a:srcRect/>
-          <a:stretch>
-            <a:fillRect/>
-          </a:stretch>
-        </p:blipFill>
-        <p:spPr bwMode="auto">
-          <a:xfrm>
-            <a:off x="2672862" y="315899"/>
-            <a:ext cx="7136038" cy="6225578"/>
-          </a:xfrm>
-          <a:prstGeom prst="rect">
-            <a:avLst/>
-          </a:prstGeom>
-          <a:noFill/>
-          <a:extLst>
-            <a:ext uri="{909E8E84-426E-40DD-AFC4-6F175D3DCCD1}">
-              <a14:hiddenFill xmlns:a14="http://schemas.microsoft.com/office/drawing/2010/main">
-                <a:solidFill>
-                  <a:srgbClr val="FFFFFF"/>
-                </a:solidFill>
-              </a14:hiddenFill>
-            </a:ext>
-          </a:extLst>
-        </p:spPr>
-      </p:pic>
-    </p:spTree>
-    <p:extLst>
-      <p:ext uri="{BB962C8B-B14F-4D97-AF65-F5344CB8AC3E}">
-        <p14:creationId xmlns:p14="http://schemas.microsoft.com/office/powerpoint/2010/main" val="3338793307"/>
-      </p:ext>
-    </p:extLst>
-  </p:cSld>
-  <p:clrMapOvr>
-    <a:masterClrMapping/>
-  </p:clrMapOvr>
-</p:sld>
-</file>
-
-<file path=ppt/slides/slide5.xml><?xml version="1.0" encoding="utf-8"?>
-<p:sld xmlns:a="http://schemas.openxmlformats.org/drawingml/2006/main" xmlns:r="http://schemas.openxmlformats.org/officeDocument/2006/relationships" xmlns:p="http://schemas.openxmlformats.org/presentationml/2006/main">
-  <p:cSld>
-    <p:spTree>
-      <p:nvGrpSpPr>
-        <p:cNvPr id="1" name=""/>
-        <p:cNvGrpSpPr/>
-        <p:nvPr/>
-      </p:nvGrpSpPr>
-      <p:grpSpPr>
-        <a:xfrm>
-          <a:off x="0" y="0"/>
-          <a:ext cx="0" cy="0"/>
-          <a:chOff x="0" y="0"/>
-          <a:chExt cx="0" cy="0"/>
-        </a:xfrm>
-      </p:grpSpPr>
-      <p:sp>
-        <p:nvSpPr>
-          <p:cNvPr id="5" name="Title 3"/>
-          <p:cNvSpPr>
-            <a:spLocks noGrp="1"/>
-          </p:cNvSpPr>
-          <p:nvPr>
-            <p:ph type="title"/>
-          </p:nvPr>
-        </p:nvSpPr>
-        <p:spPr>
-          <a:xfrm>
-            <a:off x="269823" y="1"/>
-            <a:ext cx="11083977" cy="749508"/>
-          </a:xfrm>
-        </p:spPr>
-        <p:txBody>
-          <a:bodyPr>
-            <a:normAutofit/>
-          </a:bodyPr>
-          <a:lstStyle/>
-          <a:p>
-            <a:pPr algn="ctr"/>
-            <a:r>
-              <a:rPr lang="en-US" b="1" dirty="0"/>
-              <a:t>Sequence diagram for Retailer Login</a:t>
-            </a:r>
-            <a:endParaRPr lang="en-IN" b="1" dirty="0"/>
-          </a:p>
-        </p:txBody>
-      </p:sp>
-      <p:pic>
-        <p:nvPicPr>
-          <p:cNvPr id="2" name="Picture 1"/>
-          <p:cNvPicPr>
-            <a:picLocks noChangeAspect="1"/>
-          </p:cNvPicPr>
-          <p:nvPr/>
-        </p:nvPicPr>
-        <p:blipFill>
-          <a:blip r:embed="rId2"/>
-          <a:stretch>
-            <a:fillRect/>
-          </a:stretch>
-        </p:blipFill>
-        <p:spPr>
-          <a:xfrm>
-            <a:off x="387927" y="725191"/>
-            <a:ext cx="11559233" cy="5975412"/>
-          </a:xfrm>
-          <a:prstGeom prst="rect">
-            <a:avLst/>
-          </a:prstGeom>
-        </p:spPr>
-      </p:pic>
-    </p:spTree>
-    <p:extLst>
-      <p:ext uri="{BB962C8B-B14F-4D97-AF65-F5344CB8AC3E}">
-        <p14:creationId xmlns:p14="http://schemas.microsoft.com/office/powerpoint/2010/main" val="1466627865"/>
-      </p:ext>
-    </p:extLst>
-  </p:cSld>
-  <p:clrMapOvr>
-    <a:masterClrMapping/>
-  </p:clrMapOvr>
-</p:sld>
-</file>
-
-<file path=ppt/slides/slide6.xml><?xml version="1.0" encoding="utf-8"?>
-<p:sld xmlns:a="http://schemas.openxmlformats.org/drawingml/2006/main" xmlns:r="http://schemas.openxmlformats.org/officeDocument/2006/relationships" xmlns:p="http://schemas.openxmlformats.org/presentationml/2006/main">
-  <p:cSld>
-    <p:spTree>
-      <p:nvGrpSpPr>
-        <p:cNvPr id="1" name=""/>
-        <p:cNvGrpSpPr/>
-        <p:nvPr/>
-      </p:nvGrpSpPr>
-      <p:grpSpPr>
-        <a:xfrm>
-          <a:off x="0" y="0"/>
-          <a:ext cx="0" cy="0"/>
-          <a:chOff x="0" y="0"/>
-          <a:chExt cx="0" cy="0"/>
-        </a:xfrm>
-      </p:grpSpPr>
-      <p:pic>
-        <p:nvPicPr>
-          <p:cNvPr id="1026" name="Picture 2" descr="https://documents.lucidchart.com/documents/af12140d-aed6-42ae-aab6-db1606dd6482/pages/vnMRjflWsA5V?a=2272&amp;x=-9&amp;y=-15&amp;w=1958&amp;h=770&amp;store=1&amp;accept=image%2F*&amp;auth=LCA%20f5cf8e76919165fc247058ebf144b630f5ab9067-ts%3D1569930738"/>
-          <p:cNvPicPr>
-            <a:picLocks noChangeAspect="1" noChangeArrowheads="1"/>
-          </p:cNvPicPr>
-          <p:nvPr/>
-        </p:nvPicPr>
-        <p:blipFill>
-          <a:blip r:embed="rId3">
-            <a:extLst>
-              <a:ext uri="{28A0092B-C50C-407E-A947-70E740481C1C}">
-                <a14:useLocalDpi xmlns:a14="http://schemas.microsoft.com/office/drawing/2010/main" val="0"/>
-              </a:ext>
-            </a:extLst>
-          </a:blip>
-          <a:srcRect/>
-          <a:stretch>
-            <a:fillRect/>
-          </a:stretch>
-        </p:blipFill>
-        <p:spPr bwMode="auto">
-          <a:xfrm>
-            <a:off x="200987" y="970613"/>
-            <a:ext cx="11790026" cy="4916774"/>
-          </a:xfrm>
-          <a:prstGeom prst="rect">
-            <a:avLst/>
-          </a:prstGeom>
-          <a:noFill/>
-          <a:extLst>
-            <a:ext uri="{909E8E84-426E-40DD-AFC4-6F175D3DCCD1}">
-              <a14:hiddenFill xmlns:a14="http://schemas.microsoft.com/office/drawing/2010/main">
-                <a:solidFill>
-                  <a:srgbClr val="FFFFFF"/>
-                </a:solidFill>
-              </a14:hiddenFill>
-            </a:ext>
-          </a:extLst>
-        </p:spPr>
-      </p:pic>
-      <p:sp>
-        <p:nvSpPr>
-          <p:cNvPr id="4" name="Title 3"/>
-          <p:cNvSpPr>
-            <a:spLocks noGrp="1"/>
-          </p:cNvSpPr>
-          <p:nvPr>
-            <p:ph type="title"/>
-          </p:nvPr>
-        </p:nvSpPr>
-        <p:spPr>
-          <a:xfrm>
-            <a:off x="269823" y="365125"/>
-            <a:ext cx="11083977" cy="579255"/>
-          </a:xfrm>
-        </p:spPr>
-        <p:txBody>
-          <a:bodyPr>
-            <a:normAutofit fontScale="90000"/>
-          </a:bodyPr>
-          <a:lstStyle/>
-          <a:p>
-            <a:pPr algn="ctr"/>
-            <a:r>
-              <a:rPr lang="en-US" b="1" dirty="0"/>
-              <a:t>Sequence diagram for Admin and Sales Person Login</a:t>
-            </a:r>
-            <a:endParaRPr lang="en-IN" b="1" dirty="0"/>
-          </a:p>
-        </p:txBody>
-      </p:sp>
-    </p:spTree>
-    <p:extLst>
-      <p:ext uri="{BB962C8B-B14F-4D97-AF65-F5344CB8AC3E}">
-        <p14:creationId xmlns:p14="http://schemas.microsoft.com/office/powerpoint/2010/main" val="577501118"/>
-      </p:ext>
-    </p:extLst>
-  </p:cSld>
-  <p:clrMapOvr>
-    <a:masterClrMapping/>
-  </p:clrMapOvr>
-</p:sld>
-</file>
-
-<file path=ppt/slides/slide7.xml><?xml version="1.0" encoding="utf-8"?>
-<p:sld xmlns:a="http://schemas.openxmlformats.org/drawingml/2006/main" xmlns:r="http://schemas.openxmlformats.org/officeDocument/2006/relationships" xmlns:p="http://schemas.openxmlformats.org/presentationml/2006/main">
-  <p:cSld>
-    <p:spTree>
-      <p:nvGrpSpPr>
-        <p:cNvPr id="1" name=""/>
-        <p:cNvGrpSpPr/>
-        <p:nvPr/>
-      </p:nvGrpSpPr>
-      <p:grpSpPr>
-        <a:xfrm>
-          <a:off x="0" y="0"/>
-          <a:ext cx="0" cy="0"/>
-          <a:chOff x="0" y="0"/>
-          <a:chExt cx="0" cy="0"/>
-        </a:xfrm>
-      </p:grpSpPr>
-      <p:pic>
-        <p:nvPicPr>
-          <p:cNvPr id="2" name="Content Placeholder 3">
-            <a:extLst>
-              <a:ext uri="{FF2B5EF4-FFF2-40B4-BE49-F238E27FC236}">
-                <a16:creationId xmlns:a16="http://schemas.microsoft.com/office/drawing/2014/main" id="{1367CB63-0CAD-4F17-8E6E-DF6CDEF3FD00}"/>
-              </a:ext>
-            </a:extLst>
-          </p:cNvPr>
-          <p:cNvPicPr>
-            <a:picLocks noChangeAspect="1"/>
-          </p:cNvPicPr>
-          <p:nvPr/>
-        </p:nvPicPr>
-        <p:blipFill>
-          <a:blip r:embed="rId2" cstate="print">
-            <a:extLst>
-              <a:ext uri="{28A0092B-C50C-407E-A947-70E740481C1C}">
-                <a14:useLocalDpi xmlns:a14="http://schemas.microsoft.com/office/drawing/2010/main" val="0"/>
-              </a:ext>
-            </a:extLst>
-          </a:blip>
-          <a:stretch>
-            <a:fillRect/>
-          </a:stretch>
-        </p:blipFill>
-        <p:spPr>
-          <a:xfrm>
-            <a:off x="2300006" y="1825625"/>
-            <a:ext cx="8416233" cy="4351338"/>
-          </a:xfrm>
-          <a:prstGeom prst="rect">
-            <a:avLst/>
-          </a:prstGeom>
-        </p:spPr>
-      </p:pic>
-    </p:spTree>
-    <p:extLst>
-      <p:ext uri="{BB962C8B-B14F-4D97-AF65-F5344CB8AC3E}">
-        <p14:creationId xmlns:p14="http://schemas.microsoft.com/office/powerpoint/2010/main" val="370894858"/>
       </p:ext>
     </p:extLst>
   </p:cSld>
@@ -5160,112 +3472,20 @@
       </p:grpSpPr>
       <p:pic>
         <p:nvPicPr>
-          <p:cNvPr id="2" name="Content Placeholder 3">
-            <a:extLst>
-              <a:ext uri="{FF2B5EF4-FFF2-40B4-BE49-F238E27FC236}">
-                <a16:creationId xmlns:a16="http://schemas.microsoft.com/office/drawing/2014/main" id="{DA494173-6509-45C9-ACCB-6DAD67274DEC}"/>
-              </a:ext>
-            </a:extLst>
-          </p:cNvPr>
+          <p:cNvPr id="6146" name="Picture 2" descr="https://documents.lucidchart.com/documents/d366455b-08d0-412e-9604-7000d4bd7087/pages/saSWjGW1vwpR?a=1112&amp;x=105&amp;y=-4&amp;w=1210&amp;h=884&amp;store=1&amp;accept=image%2F*&amp;auth=LCA%206ffa078569be00a7ad66eb9f9b7d7d26d1011843-ts%3D1569919834"/>
           <p:cNvPicPr>
-            <a:picLocks noChangeAspect="1"/>
+            <a:picLocks noChangeAspect="1" noChangeArrowheads="1"/>
           </p:cNvPicPr>
           <p:nvPr/>
         </p:nvPicPr>
         <p:blipFill>
-          <a:blip r:embed="rId2" cstate="print">
+          <a:blip r:embed="rId2">
             <a:extLst>
               <a:ext uri="{28A0092B-C50C-407E-A947-70E740481C1C}">
                 <a14:useLocalDpi xmlns:a14="http://schemas.microsoft.com/office/drawing/2010/main" val="0"/>
               </a:ext>
             </a:extLst>
           </a:blip>
-          <a:stretch>
-            <a:fillRect/>
-          </a:stretch>
-        </p:blipFill>
-        <p:spPr>
-          <a:xfrm>
-            <a:off x="1165263" y="888642"/>
-            <a:ext cx="9861474" cy="5801932"/>
-          </a:xfrm>
-          <a:prstGeom prst="rect">
-            <a:avLst/>
-          </a:prstGeom>
-        </p:spPr>
-      </p:pic>
-    </p:spTree>
-    <p:extLst>
-      <p:ext uri="{BB962C8B-B14F-4D97-AF65-F5344CB8AC3E}">
-        <p14:creationId xmlns:p14="http://schemas.microsoft.com/office/powerpoint/2010/main" val="2403646443"/>
-      </p:ext>
-    </p:extLst>
-  </p:cSld>
-  <p:clrMapOvr>
-    <a:masterClrMapping/>
-  </p:clrMapOvr>
-</p:sld>
-</file>
-
-<file path=ppt/slides/slide9.xml><?xml version="1.0" encoding="utf-8"?>
-<p:sld xmlns:a="http://schemas.openxmlformats.org/drawingml/2006/main" xmlns:r="http://schemas.openxmlformats.org/officeDocument/2006/relationships" xmlns:p="http://schemas.openxmlformats.org/presentationml/2006/main">
-  <p:cSld>
-    <p:spTree>
-      <p:nvGrpSpPr>
-        <p:cNvPr id="1" name=""/>
-        <p:cNvGrpSpPr/>
-        <p:nvPr/>
-      </p:nvGrpSpPr>
-      <p:grpSpPr>
-        <a:xfrm>
-          <a:off x="0" y="0"/>
-          <a:ext cx="0" cy="0"/>
-          <a:chOff x="0" y="0"/>
-          <a:chExt cx="0" cy="0"/>
-        </a:xfrm>
-      </p:grpSpPr>
-      <p:sp>
-        <p:nvSpPr>
-          <p:cNvPr id="5" name="Rectangle 4"/>
-          <p:cNvSpPr/>
-          <p:nvPr/>
-        </p:nvSpPr>
-        <p:spPr>
-          <a:xfrm>
-            <a:off x="2101101" y="710684"/>
-            <a:ext cx="7712945" cy="584775"/>
-          </a:xfrm>
-          <a:prstGeom prst="rect">
-            <a:avLst/>
-          </a:prstGeom>
-        </p:spPr>
-        <p:txBody>
-          <a:bodyPr wrap="none">
-            <a:spAutoFit/>
-          </a:bodyPr>
-          <a:lstStyle/>
-          <a:p>
-            <a:r>
-              <a:rPr lang="en-US" sz="3200" b="1" dirty="0">
-                <a:latin typeface="Times New Roman" panose="02020603050405020304" pitchFamily="18" charset="0"/>
-                <a:cs typeface="Times New Roman" panose="02020603050405020304" pitchFamily="18" charset="0"/>
-              </a:rPr>
-              <a:t>Sequence Diagram for Sales Person Details</a:t>
-            </a:r>
-            <a:endParaRPr lang="en-US" sz="3200" dirty="0"/>
-          </a:p>
-        </p:txBody>
-      </p:sp>
-      <p:pic>
-        <p:nvPicPr>
-          <p:cNvPr id="5130" name="Picture 10" descr="https://documents.lucidchart.com/documents/54cc50d9-20e3-4853-8f1d-888a3d1998b5/pages/0_0?a=1067&amp;x=2&amp;y=6&amp;w=1349&amp;h=1215&amp;store=1&amp;accept=image%2F*&amp;auth=LCA%209ebd9eb1b40cd41ba1d23cdc65aea14bc9c32075-ts%3D1568550849"/>
-          <p:cNvPicPr>
-            <a:picLocks noChangeAspect="1" noChangeArrowheads="1"/>
-          </p:cNvPicPr>
-          <p:nvPr/>
-        </p:nvPicPr>
-        <p:blipFill>
-          <a:blip r:embed="rId2"/>
           <a:srcRect/>
           <a:stretch>
             <a:fillRect/>
@@ -5273,19 +3493,28 @@
         </p:blipFill>
         <p:spPr bwMode="auto">
           <a:xfrm>
-            <a:off x="914401" y="1211262"/>
-            <a:ext cx="10420350" cy="5284788"/>
+            <a:off x="1603375" y="323850"/>
+            <a:ext cx="8648700" cy="6315076"/>
           </a:xfrm>
           <a:prstGeom prst="rect">
             <a:avLst/>
           </a:prstGeom>
           <a:noFill/>
+          <a:extLst>
+            <a:ext uri="{909E8E84-426E-40DD-AFC4-6F175D3DCCD1}">
+              <a14:hiddenFill xmlns:a14="http://schemas.microsoft.com/office/drawing/2010/main">
+                <a:solidFill>
+                  <a:srgbClr val="FFFFFF"/>
+                </a:solidFill>
+              </a14:hiddenFill>
+            </a:ext>
+          </a:extLst>
         </p:spPr>
       </p:pic>
     </p:spTree>
     <p:extLst>
       <p:ext uri="{BB962C8B-B14F-4D97-AF65-F5344CB8AC3E}">
-        <p14:creationId xmlns:p14="http://schemas.microsoft.com/office/powerpoint/2010/main" val="844658709"/>
+        <p14:creationId xmlns:p14="http://schemas.microsoft.com/office/powerpoint/2010/main" val="1951549789"/>
       </p:ext>
     </p:extLst>
   </p:cSld>
@@ -5554,299 +3783,4 @@
     </a:ext>
   </a:extLst>
 </a:theme>
-</file>
-
-<file path=ppt/theme/theme2.xml><?xml version="1.0" encoding="utf-8"?>
-<a:theme xmlns:a="http://schemas.openxmlformats.org/drawingml/2006/main" name="Office Theme">
-  <a:themeElements>
-    <a:clrScheme name="Office">
-      <a:dk1>
-        <a:sysClr val="windowText" lastClr="000000"/>
-      </a:dk1>
-      <a:lt1>
-        <a:sysClr val="window" lastClr="FFFFFF"/>
-      </a:lt1>
-      <a:dk2>
-        <a:srgbClr val="44546A"/>
-      </a:dk2>
-      <a:lt2>
-        <a:srgbClr val="E7E6E6"/>
-      </a:lt2>
-      <a:accent1>
-        <a:srgbClr val="4472C4"/>
-      </a:accent1>
-      <a:accent2>
-        <a:srgbClr val="ED7D31"/>
-      </a:accent2>
-      <a:accent3>
-        <a:srgbClr val="A5A5A5"/>
-      </a:accent3>
-      <a:accent4>
-        <a:srgbClr val="FFC000"/>
-      </a:accent4>
-      <a:accent5>
-        <a:srgbClr val="5B9BD5"/>
-      </a:accent5>
-      <a:accent6>
-        <a:srgbClr val="70AD47"/>
-      </a:accent6>
-      <a:hlink>
-        <a:srgbClr val="0563C1"/>
-      </a:hlink>
-      <a:folHlink>
-        <a:srgbClr val="954F72"/>
-      </a:folHlink>
-    </a:clrScheme>
-    <a:fontScheme name="Office">
-      <a:majorFont>
-        <a:latin typeface="Calibri Light" panose="020F0302020204030204"/>
-        <a:ea typeface=""/>
-        <a:cs typeface=""/>
-        <a:font script="Jpan" typeface="游ゴシック Light"/>
-        <a:font script="Hang" typeface="맑은 고딕"/>
-        <a:font script="Hans" typeface="等线 Light"/>
-        <a:font script="Hant" typeface="新細明體"/>
-        <a:font script="Arab" typeface="Times New Roman"/>
-        <a:font script="Hebr" typeface="Times New Roman"/>
-        <a:font script="Thai" typeface="Angsana New"/>
-        <a:font script="Ethi" typeface="Nyala"/>
-        <a:font script="Beng" typeface="Vrinda"/>
-        <a:font script="Gujr" typeface="Shruti"/>
-        <a:font script="Khmr" typeface="MoolBoran"/>
-        <a:font script="Knda" typeface="Tunga"/>
-        <a:font script="Guru" typeface="Raavi"/>
-        <a:font script="Cans" typeface="Euphemia"/>
-        <a:font script="Cher" typeface="Plantagenet Cherokee"/>
-        <a:font script="Yiii" typeface="Microsoft Yi Baiti"/>
-        <a:font script="Tibt" typeface="Microsoft Himalaya"/>
-        <a:font script="Thaa" typeface="MV Boli"/>
-        <a:font script="Deva" typeface="Mangal"/>
-        <a:font script="Telu" typeface="Gautami"/>
-        <a:font script="Taml" typeface="Latha"/>
-        <a:font script="Syrc" typeface="Estrangelo Edessa"/>
-        <a:font script="Orya" typeface="Kalinga"/>
-        <a:font script="Mlym" typeface="Kartika"/>
-        <a:font script="Laoo" typeface="DokChampa"/>
-        <a:font script="Sinh" typeface="Iskoola Pota"/>
-        <a:font script="Mong" typeface="Mongolian Baiti"/>
-        <a:font script="Viet" typeface="Times New Roman"/>
-        <a:font script="Uigh" typeface="Microsoft Uighur"/>
-        <a:font script="Geor" typeface="Sylfaen"/>
-        <a:font script="Armn" typeface="Arial"/>
-        <a:font script="Bugi" typeface="Leelawadee UI"/>
-        <a:font script="Bopo" typeface="Microsoft JhengHei"/>
-        <a:font script="Java" typeface="Javanese Text"/>
-        <a:font script="Lisu" typeface="Segoe UI"/>
-        <a:font script="Mymr" typeface="Myanmar Text"/>
-        <a:font script="Nkoo" typeface="Ebrima"/>
-        <a:font script="Olck" typeface="Nirmala UI"/>
-        <a:font script="Osma" typeface="Ebrima"/>
-        <a:font script="Phag" typeface="Phagspa"/>
-        <a:font script="Syrn" typeface="Estrangelo Edessa"/>
-        <a:font script="Syrj" typeface="Estrangelo Edessa"/>
-        <a:font script="Syre" typeface="Estrangelo Edessa"/>
-        <a:font script="Sora" typeface="Nirmala UI"/>
-        <a:font script="Tale" typeface="Microsoft Tai Le"/>
-        <a:font script="Talu" typeface="Microsoft New Tai Lue"/>
-        <a:font script="Tfng" typeface="Ebrima"/>
-      </a:majorFont>
-      <a:minorFont>
-        <a:latin typeface="Calibri" panose="020F0502020204030204"/>
-        <a:ea typeface=""/>
-        <a:cs typeface=""/>
-        <a:font script="Jpan" typeface="游ゴシック"/>
-        <a:font script="Hang" typeface="맑은 고딕"/>
-        <a:font script="Hans" typeface="等线"/>
-        <a:font script="Hant" typeface="新細明體"/>
-        <a:font script="Arab" typeface="Arial"/>
-        <a:font script="Hebr" typeface="Arial"/>
-        <a:font script="Thai" typeface="Cordia New"/>
-        <a:font script="Ethi" typeface="Nyala"/>
-        <a:font script="Beng" typeface="Vrinda"/>
-        <a:font script="Gujr" typeface="Shruti"/>
-        <a:font script="Khmr" typeface="DaunPenh"/>
-        <a:font script="Knda" typeface="Tunga"/>
-        <a:font script="Guru" typeface="Raavi"/>
-        <a:font script="Cans" typeface="Euphemia"/>
-        <a:font script="Cher" typeface="Plantagenet Cherokee"/>
-        <a:font script="Yiii" typeface="Microsoft Yi Baiti"/>
-        <a:font script="Tibt" typeface="Microsoft Himalaya"/>
-        <a:font script="Thaa" typeface="MV Boli"/>
-        <a:font script="Deva" typeface="Mangal"/>
-        <a:font script="Telu" typeface="Gautami"/>
-        <a:font script="Taml" typeface="Latha"/>
-        <a:font script="Syrc" typeface="Estrangelo Edessa"/>
-        <a:font script="Orya" typeface="Kalinga"/>
-        <a:font script="Mlym" typeface="Kartika"/>
-        <a:font script="Laoo" typeface="DokChampa"/>
-        <a:font script="Sinh" typeface="Iskoola Pota"/>
-        <a:font script="Mong" typeface="Mongolian Baiti"/>
-        <a:font script="Viet" typeface="Arial"/>
-        <a:font script="Uigh" typeface="Microsoft Uighur"/>
-        <a:font script="Geor" typeface="Sylfaen"/>
-        <a:font script="Armn" typeface="Arial"/>
-        <a:font script="Bugi" typeface="Leelawadee UI"/>
-        <a:font script="Bopo" typeface="Microsoft JhengHei"/>
-        <a:font script="Java" typeface="Javanese Text"/>
-        <a:font script="Lisu" typeface="Segoe UI"/>
-        <a:font script="Mymr" typeface="Myanmar Text"/>
-        <a:font script="Nkoo" typeface="Ebrima"/>
-        <a:font script="Olck" typeface="Nirmala UI"/>
-        <a:font script="Osma" typeface="Ebrima"/>
-        <a:font script="Phag" typeface="Phagspa"/>
-        <a:font script="Syrn" typeface="Estrangelo Edessa"/>
-        <a:font script="Syrj" typeface="Estrangelo Edessa"/>
-        <a:font script="Syre" typeface="Estrangelo Edessa"/>
-        <a:font script="Sora" typeface="Nirmala UI"/>
-        <a:font script="Tale" typeface="Microsoft Tai Le"/>
-        <a:font script="Talu" typeface="Microsoft New Tai Lue"/>
-        <a:font script="Tfng" typeface="Ebrima"/>
-      </a:minorFont>
-    </a:fontScheme>
-    <a:fmtScheme name="Office">
-      <a:fillStyleLst>
-        <a:solidFill>
-          <a:schemeClr val="phClr"/>
-        </a:solidFill>
-        <a:gradFill rotWithShape="1">
-          <a:gsLst>
-            <a:gs pos="0">
-              <a:schemeClr val="phClr">
-                <a:lumMod val="110000"/>
-                <a:satMod val="105000"/>
-                <a:tint val="67000"/>
-              </a:schemeClr>
-            </a:gs>
-            <a:gs pos="50000">
-              <a:schemeClr val="phClr">
-                <a:lumMod val="105000"/>
-                <a:satMod val="103000"/>
-                <a:tint val="73000"/>
-              </a:schemeClr>
-            </a:gs>
-            <a:gs pos="100000">
-              <a:schemeClr val="phClr">
-                <a:lumMod val="105000"/>
-                <a:satMod val="109000"/>
-                <a:tint val="81000"/>
-              </a:schemeClr>
-            </a:gs>
-          </a:gsLst>
-          <a:lin ang="5400000" scaled="0"/>
-        </a:gradFill>
-        <a:gradFill rotWithShape="1">
-          <a:gsLst>
-            <a:gs pos="0">
-              <a:schemeClr val="phClr">
-                <a:satMod val="103000"/>
-                <a:lumMod val="102000"/>
-                <a:tint val="94000"/>
-              </a:schemeClr>
-            </a:gs>
-            <a:gs pos="50000">
-              <a:schemeClr val="phClr">
-                <a:satMod val="110000"/>
-                <a:lumMod val="100000"/>
-                <a:shade val="100000"/>
-              </a:schemeClr>
-            </a:gs>
-            <a:gs pos="100000">
-              <a:schemeClr val="phClr">
-                <a:lumMod val="99000"/>
-                <a:satMod val="120000"/>
-                <a:shade val="78000"/>
-              </a:schemeClr>
-            </a:gs>
-          </a:gsLst>
-          <a:lin ang="5400000" scaled="0"/>
-        </a:gradFill>
-      </a:fillStyleLst>
-      <a:lnStyleLst>
-        <a:ln w="6350" cap="flat" cmpd="sng" algn="ctr">
-          <a:solidFill>
-            <a:schemeClr val="phClr"/>
-          </a:solidFill>
-          <a:prstDash val="solid"/>
-          <a:miter lim="800000"/>
-        </a:ln>
-        <a:ln w="12700" cap="flat" cmpd="sng" algn="ctr">
-          <a:solidFill>
-            <a:schemeClr val="phClr"/>
-          </a:solidFill>
-          <a:prstDash val="solid"/>
-          <a:miter lim="800000"/>
-        </a:ln>
-        <a:ln w="19050" cap="flat" cmpd="sng" algn="ctr">
-          <a:solidFill>
-            <a:schemeClr val="phClr"/>
-          </a:solidFill>
-          <a:prstDash val="solid"/>
-          <a:miter lim="800000"/>
-        </a:ln>
-      </a:lnStyleLst>
-      <a:effectStyleLst>
-        <a:effectStyle>
-          <a:effectLst/>
-        </a:effectStyle>
-        <a:effectStyle>
-          <a:effectLst/>
-        </a:effectStyle>
-        <a:effectStyle>
-          <a:effectLst>
-            <a:outerShdw blurRad="57150" dist="19050" dir="5400000" algn="ctr" rotWithShape="0">
-              <a:srgbClr val="000000">
-                <a:alpha val="63000"/>
-              </a:srgbClr>
-            </a:outerShdw>
-          </a:effectLst>
-        </a:effectStyle>
-      </a:effectStyleLst>
-      <a:bgFillStyleLst>
-        <a:solidFill>
-          <a:schemeClr val="phClr"/>
-        </a:solidFill>
-        <a:solidFill>
-          <a:schemeClr val="phClr">
-            <a:tint val="95000"/>
-            <a:satMod val="170000"/>
-          </a:schemeClr>
-        </a:solidFill>
-        <a:gradFill rotWithShape="1">
-          <a:gsLst>
-            <a:gs pos="0">
-              <a:schemeClr val="phClr">
-                <a:tint val="93000"/>
-                <a:satMod val="150000"/>
-                <a:shade val="98000"/>
-                <a:lumMod val="102000"/>
-              </a:schemeClr>
-            </a:gs>
-            <a:gs pos="50000">
-              <a:schemeClr val="phClr">
-                <a:tint val="98000"/>
-                <a:satMod val="130000"/>
-                <a:shade val="90000"/>
-                <a:lumMod val="103000"/>
-              </a:schemeClr>
-            </a:gs>
-            <a:gs pos="100000">
-              <a:schemeClr val="phClr">
-                <a:shade val="63000"/>
-                <a:satMod val="120000"/>
-              </a:schemeClr>
-            </a:gs>
-          </a:gsLst>
-          <a:lin ang="5400000" scaled="0"/>
-        </a:gradFill>
-      </a:bgFillStyleLst>
-    </a:fmtScheme>
-  </a:themeElements>
-  <a:objectDefaults/>
-  <a:extraClrSchemeLst/>
-  <a:extLst>
-    <a:ext uri="{05A4C25C-085E-4340-85A3-A5531E510DB2}">
-      <thm15:themeFamily xmlns:thm15="http://schemas.microsoft.com/office/thememl/2012/main" name="Office Theme" id="{62F939B6-93AF-4DB8-9C6B-D6C7DFDC589F}" vid="{4A3C46E8-61CC-4603-A589-7422A47A8E4A}"/>
-    </a:ext>
-  </a:extLst>
-</a:theme>
 </file>
</xml_diff>